<commit_message>
Update fuzzy find diagram in dev guide
</commit_message>
<xml_diff>
--- a/docs/diagrams/FuzzyFindActivityDiagram.pptx
+++ b/docs/diagrams/FuzzyFindActivityDiagram.pptx
@@ -265,7 +265,7 @@
           <a:p>
             <a:fld id="{542F47FF-5056-41FF-A1F8-23A414798AA4}" type="datetimeFigureOut">
               <a:rPr lang="en-SG" smtClean="0"/>
-              <a:t>11/10/2017</a:t>
+              <a:t>13/10/2017</a:t>
             </a:fld>
             <a:endParaRPr lang="en-SG"/>
           </a:p>
@@ -465,7 +465,7 @@
           <a:p>
             <a:fld id="{542F47FF-5056-41FF-A1F8-23A414798AA4}" type="datetimeFigureOut">
               <a:rPr lang="en-SG" smtClean="0"/>
-              <a:t>11/10/2017</a:t>
+              <a:t>13/10/2017</a:t>
             </a:fld>
             <a:endParaRPr lang="en-SG"/>
           </a:p>
@@ -675,7 +675,7 @@
           <a:p>
             <a:fld id="{542F47FF-5056-41FF-A1F8-23A414798AA4}" type="datetimeFigureOut">
               <a:rPr lang="en-SG" smtClean="0"/>
-              <a:t>11/10/2017</a:t>
+              <a:t>13/10/2017</a:t>
             </a:fld>
             <a:endParaRPr lang="en-SG"/>
           </a:p>
@@ -875,7 +875,7 @@
           <a:p>
             <a:fld id="{542F47FF-5056-41FF-A1F8-23A414798AA4}" type="datetimeFigureOut">
               <a:rPr lang="en-SG" smtClean="0"/>
-              <a:t>11/10/2017</a:t>
+              <a:t>13/10/2017</a:t>
             </a:fld>
             <a:endParaRPr lang="en-SG"/>
           </a:p>
@@ -1151,7 +1151,7 @@
           <a:p>
             <a:fld id="{542F47FF-5056-41FF-A1F8-23A414798AA4}" type="datetimeFigureOut">
               <a:rPr lang="en-SG" smtClean="0"/>
-              <a:t>11/10/2017</a:t>
+              <a:t>13/10/2017</a:t>
             </a:fld>
             <a:endParaRPr lang="en-SG"/>
           </a:p>
@@ -1419,7 +1419,7 @@
           <a:p>
             <a:fld id="{542F47FF-5056-41FF-A1F8-23A414798AA4}" type="datetimeFigureOut">
               <a:rPr lang="en-SG" smtClean="0"/>
-              <a:t>11/10/2017</a:t>
+              <a:t>13/10/2017</a:t>
             </a:fld>
             <a:endParaRPr lang="en-SG"/>
           </a:p>
@@ -1834,7 +1834,7 @@
           <a:p>
             <a:fld id="{542F47FF-5056-41FF-A1F8-23A414798AA4}" type="datetimeFigureOut">
               <a:rPr lang="en-SG" smtClean="0"/>
-              <a:t>11/10/2017</a:t>
+              <a:t>13/10/2017</a:t>
             </a:fld>
             <a:endParaRPr lang="en-SG"/>
           </a:p>
@@ -1976,7 +1976,7 @@
           <a:p>
             <a:fld id="{542F47FF-5056-41FF-A1F8-23A414798AA4}" type="datetimeFigureOut">
               <a:rPr lang="en-SG" smtClean="0"/>
-              <a:t>11/10/2017</a:t>
+              <a:t>13/10/2017</a:t>
             </a:fld>
             <a:endParaRPr lang="en-SG"/>
           </a:p>
@@ -2089,7 +2089,7 @@
           <a:p>
             <a:fld id="{542F47FF-5056-41FF-A1F8-23A414798AA4}" type="datetimeFigureOut">
               <a:rPr lang="en-SG" smtClean="0"/>
-              <a:t>11/10/2017</a:t>
+              <a:t>13/10/2017</a:t>
             </a:fld>
             <a:endParaRPr lang="en-SG"/>
           </a:p>
@@ -2402,7 +2402,7 @@
           <a:p>
             <a:fld id="{542F47FF-5056-41FF-A1F8-23A414798AA4}" type="datetimeFigureOut">
               <a:rPr lang="en-SG" smtClean="0"/>
-              <a:t>11/10/2017</a:t>
+              <a:t>13/10/2017</a:t>
             </a:fld>
             <a:endParaRPr lang="en-SG"/>
           </a:p>
@@ -2691,7 +2691,7 @@
           <a:p>
             <a:fld id="{542F47FF-5056-41FF-A1F8-23A414798AA4}" type="datetimeFigureOut">
               <a:rPr lang="en-SG" smtClean="0"/>
-              <a:t>11/10/2017</a:t>
+              <a:t>13/10/2017</a:t>
             </a:fld>
             <a:endParaRPr lang="en-SG"/>
           </a:p>
@@ -2934,7 +2934,7 @@
           <a:p>
             <a:fld id="{542F47FF-5056-41FF-A1F8-23A414798AA4}" type="datetimeFigureOut">
               <a:rPr lang="en-SG" smtClean="0"/>
-              <a:t>11/10/2017</a:t>
+              <a:t>13/10/2017</a:t>
             </a:fld>
             <a:endParaRPr lang="en-SG"/>
           </a:p>
@@ -3353,10 +3353,10 @@
       </p:grpSpPr>
       <p:sp>
         <p:nvSpPr>
-          <p:cNvPr id="4" name="Oval 3">
-            <a:extLst>
-              <a:ext uri="{FF2B5EF4-FFF2-40B4-BE49-F238E27FC236}">
-                <a16:creationId xmlns:a16="http://schemas.microsoft.com/office/drawing/2014/main" id="{D45F487B-A914-4C8E-B564-00C9D621567D}"/>
+          <p:cNvPr id="28" name="Rectangle: Rounded Corners 21">
+            <a:extLst>
+              <a:ext uri="{FF2B5EF4-FFF2-40B4-BE49-F238E27FC236}">
+                <a16:creationId xmlns:a16="http://schemas.microsoft.com/office/drawing/2014/main" id="{A323A4FC-FF89-4B75-A4E8-6FA28B7DCA83}"/>
               </a:ext>
             </a:extLst>
           </p:cNvPr>
@@ -3365,7 +3365,114 @@
         </p:nvSpPr>
         <p:spPr>
           <a:xfrm>
-            <a:off x="-633070" y="-543986"/>
+            <a:off x="2411206" y="-199386"/>
+            <a:ext cx="11331688" cy="4663810"/>
+          </a:xfrm>
+          <a:prstGeom prst="roundRect">
+            <a:avLst/>
+          </a:prstGeom>
+        </p:spPr>
+        <p:style>
+          <a:lnRef idx="2">
+            <a:schemeClr val="accent3">
+              <a:shade val="50000"/>
+            </a:schemeClr>
+          </a:lnRef>
+          <a:fillRef idx="1">
+            <a:schemeClr val="accent3"/>
+          </a:fillRef>
+          <a:effectRef idx="0">
+            <a:schemeClr val="accent3"/>
+          </a:effectRef>
+          <a:fontRef idx="minor">
+            <a:schemeClr val="lt1"/>
+          </a:fontRef>
+        </p:style>
+        <p:txBody>
+          <a:bodyPr rot="0" spcFirstLastPara="0" vertOverflow="overflow" horzOverflow="overflow" vert="horz" wrap="square" lIns="91440" tIns="45721" rIns="91440" bIns="45721" numCol="1" spcCol="0" rtlCol="0" fromWordArt="0" anchor="ctr" anchorCtr="0" forceAA="0" compatLnSpc="1">
+            <a:prstTxWarp prst="textNoShape">
+              <a:avLst/>
+            </a:prstTxWarp>
+            <a:noAutofit/>
+          </a:bodyPr>
+          <a:lstStyle/>
+          <a:p>
+            <a:pPr algn="ctr"/>
+            <a:endParaRPr lang="en-SG" sz="1801" dirty="0"/>
+          </a:p>
+        </p:txBody>
+      </p:sp>
+      <p:sp>
+        <p:nvSpPr>
+          <p:cNvPr id="37" name="Rectangle: Rounded Corners 21">
+            <a:extLst>
+              <a:ext uri="{FF2B5EF4-FFF2-40B4-BE49-F238E27FC236}">
+                <a16:creationId xmlns:a16="http://schemas.microsoft.com/office/drawing/2014/main" id="{A323A4FC-FF89-4B75-A4E8-6FA28B7DCA83}"/>
+              </a:ext>
+            </a:extLst>
+          </p:cNvPr>
+          <p:cNvSpPr/>
+          <p:nvPr/>
+        </p:nvSpPr>
+        <p:spPr>
+          <a:xfrm>
+            <a:off x="4339596" y="139407"/>
+            <a:ext cx="8870210" cy="3625769"/>
+          </a:xfrm>
+          <a:prstGeom prst="roundRect">
+            <a:avLst/>
+          </a:prstGeom>
+          <a:solidFill>
+            <a:schemeClr val="bg1">
+              <a:lumMod val="85000"/>
+            </a:schemeClr>
+          </a:solidFill>
+        </p:spPr>
+        <p:style>
+          <a:lnRef idx="2">
+            <a:schemeClr val="accent3">
+              <a:shade val="50000"/>
+            </a:schemeClr>
+          </a:lnRef>
+          <a:fillRef idx="1">
+            <a:schemeClr val="accent3"/>
+          </a:fillRef>
+          <a:effectRef idx="0">
+            <a:schemeClr val="accent3"/>
+          </a:effectRef>
+          <a:fontRef idx="minor">
+            <a:schemeClr val="lt1"/>
+          </a:fontRef>
+        </p:style>
+        <p:txBody>
+          <a:bodyPr rot="0" spcFirstLastPara="0" vertOverflow="overflow" horzOverflow="overflow" vert="horz" wrap="square" lIns="91440" tIns="45721" rIns="91440" bIns="45721" numCol="1" spcCol="0" rtlCol="0" fromWordArt="0" anchor="ctr" anchorCtr="0" forceAA="0" compatLnSpc="1">
+            <a:prstTxWarp prst="textNoShape">
+              <a:avLst/>
+            </a:prstTxWarp>
+            <a:noAutofit/>
+          </a:bodyPr>
+          <a:lstStyle/>
+          <a:p>
+            <a:pPr algn="ctr"/>
+            <a:endParaRPr lang="en-SG" sz="1801" dirty="0"/>
+          </a:p>
+        </p:txBody>
+      </p:sp>
+      <p:sp>
+        <p:nvSpPr>
+          <p:cNvPr id="4" name="Oval 3">
+            <a:extLst>
+              <a:ext uri="{FF2B5EF4-FFF2-40B4-BE49-F238E27FC236}">
+                <a16:creationId xmlns:a16="http://schemas.microsoft.com/office/drawing/2014/main" id="{D45F487B-A914-4C8E-B564-00C9D621567D}"/>
+              </a:ext>
+            </a:extLst>
+          </p:cNvPr>
+          <p:cNvSpPr/>
+          <p:nvPr/>
+        </p:nvSpPr>
+        <p:spPr>
+          <a:xfrm>
+            <a:off x="-1376020" y="1627714"/>
             <a:ext cx="235669" cy="235669"/>
           </a:xfrm>
           <a:prstGeom prst="ellipse">
@@ -3418,7 +3525,7 @@
         </p:nvCxnSpPr>
         <p:spPr>
           <a:xfrm>
-            <a:off x="-397401" y="-426151"/>
+            <a:off x="-1140351" y="1745549"/>
             <a:ext cx="933255" cy="0"/>
           </a:xfrm>
           <a:prstGeom prst="straightConnector1">
@@ -3457,7 +3564,7 @@
         </p:nvSpPr>
         <p:spPr>
           <a:xfrm>
-            <a:off x="535854" y="-784370"/>
+            <a:off x="-207096" y="1387330"/>
             <a:ext cx="2187019" cy="716437"/>
           </a:xfrm>
           <a:prstGeom prst="roundRect">
@@ -3518,7 +3625,7 @@
         </p:nvCxnSpPr>
         <p:spPr>
           <a:xfrm>
-            <a:off x="1629364" y="-67933"/>
+            <a:off x="886414" y="2103767"/>
             <a:ext cx="0" cy="774160"/>
           </a:xfrm>
           <a:prstGeom prst="straightConnector1">
@@ -3557,7 +3664,7 @@
         </p:nvSpPr>
         <p:spPr>
           <a:xfrm rot="5400000">
-            <a:off x="3454858" y="818714"/>
+            <a:off x="4813476" y="2995760"/>
             <a:ext cx="480766" cy="480766"/>
           </a:xfrm>
           <a:prstGeom prst="diamond">
@@ -3592,26 +3699,106 @@
           </a:p>
         </p:txBody>
       </p:sp>
+      <p:sp>
+        <p:nvSpPr>
+          <p:cNvPr id="19" name="TextBox 18">
+            <a:extLst>
+              <a:ext uri="{FF2B5EF4-FFF2-40B4-BE49-F238E27FC236}">
+                <a16:creationId xmlns:a16="http://schemas.microsoft.com/office/drawing/2014/main" id="{3ABD3846-DF71-49C4-AE22-6CE1C8B39149}"/>
+              </a:ext>
+            </a:extLst>
+          </p:cNvPr>
+          <p:cNvSpPr txBox="1"/>
+          <p:nvPr/>
+        </p:nvSpPr>
+        <p:spPr>
+          <a:xfrm>
+            <a:off x="4709896" y="383203"/>
+            <a:ext cx="1972764" cy="369460"/>
+          </a:xfrm>
+          <a:prstGeom prst="rect">
+            <a:avLst/>
+          </a:prstGeom>
+          <a:noFill/>
+        </p:spPr>
+        <p:txBody>
+          <a:bodyPr wrap="square" rtlCol="0">
+            <a:spAutoFit/>
+          </a:bodyPr>
+          <a:lstStyle/>
+          <a:p>
+            <a:pPr algn="r"/>
+            <a:r>
+              <a:rPr lang="en-SG" sz="1801" dirty="0" smtClean="0"/>
+              <a:t>[is loose match]</a:t>
+            </a:r>
+            <a:endParaRPr lang="en-SG" sz="1801" dirty="0"/>
+          </a:p>
+        </p:txBody>
+      </p:sp>
+      <p:sp>
+        <p:nvSpPr>
+          <p:cNvPr id="20" name="TextBox 19">
+            <a:extLst>
+              <a:ext uri="{FF2B5EF4-FFF2-40B4-BE49-F238E27FC236}">
+                <a16:creationId xmlns:a16="http://schemas.microsoft.com/office/drawing/2014/main" id="{950BB788-4B9F-4654-A5F0-F380DA681824}"/>
+              </a:ext>
+            </a:extLst>
+          </p:cNvPr>
+          <p:cNvSpPr txBox="1"/>
+          <p:nvPr/>
+        </p:nvSpPr>
+        <p:spPr>
+          <a:xfrm>
+            <a:off x="6036376" y="2848412"/>
+            <a:ext cx="853127" cy="369460"/>
+          </a:xfrm>
+          <a:prstGeom prst="rect">
+            <a:avLst/>
+          </a:prstGeom>
+          <a:noFill/>
+        </p:spPr>
+        <p:txBody>
+          <a:bodyPr wrap="square" rtlCol="0">
+            <a:spAutoFit/>
+          </a:bodyPr>
+          <a:lstStyle/>
+          <a:p>
+            <a:pPr algn="r"/>
+            <a:r>
+              <a:rPr lang="en-SG" sz="1801" dirty="0"/>
+              <a:t>[else]</a:t>
+            </a:r>
+          </a:p>
+        </p:txBody>
+      </p:sp>
       <p:cxnSp>
         <p:nvCxnSpPr>
-          <p:cNvPr id="18" name="Straight Connector 17">
-            <a:extLst>
-              <a:ext uri="{FF2B5EF4-FFF2-40B4-BE49-F238E27FC236}">
-                <a16:creationId xmlns:a16="http://schemas.microsoft.com/office/drawing/2014/main" id="{E9F9F46E-F315-4E20-BA19-DC5A481900A9}"/>
-              </a:ext>
-            </a:extLst>
-          </p:cNvPr>
-          <p:cNvCxnSpPr/>
+          <p:cNvPr id="39" name="Straight Arrow Connector 38">
+            <a:extLst>
+              <a:ext uri="{FF2B5EF4-FFF2-40B4-BE49-F238E27FC236}">
+                <a16:creationId xmlns:a16="http://schemas.microsoft.com/office/drawing/2014/main" id="{07205C61-8174-4C37-BC30-E1E54EBEAF6C}"/>
+              </a:ext>
+            </a:extLst>
+          </p:cNvPr>
+          <p:cNvCxnSpPr>
+            <a:cxnSpLocks/>
+            <a:stCxn id="12" idx="0"/>
+            <a:endCxn id="144" idx="2"/>
+          </p:cNvCxnSpPr>
           <p:nvPr/>
         </p:nvCxnSpPr>
         <p:spPr>
-          <a:xfrm rot="5400000">
-            <a:off x="3359017" y="1635703"/>
-            <a:ext cx="672446" cy="1"/>
-          </a:xfrm>
-          <a:prstGeom prst="line">
+          <a:xfrm>
+            <a:off x="5294242" y="3236143"/>
+            <a:ext cx="2688769" cy="0"/>
+          </a:xfrm>
+          <a:prstGeom prst="straightConnector1">
             <a:avLst/>
           </a:prstGeom>
+          <a:ln>
+            <a:tailEnd type="triangle"/>
+          </a:ln>
         </p:spPr>
         <p:style>
           <a:lnRef idx="1">
@@ -3630,83 +3817,10 @@
       </p:cxnSp>
       <p:sp>
         <p:nvSpPr>
-          <p:cNvPr id="19" name="TextBox 18">
-            <a:extLst>
-              <a:ext uri="{FF2B5EF4-FFF2-40B4-BE49-F238E27FC236}">
-                <a16:creationId xmlns:a16="http://schemas.microsoft.com/office/drawing/2014/main" id="{3ABD3846-DF71-49C4-AE22-6CE1C8B39149}"/>
-              </a:ext>
-            </a:extLst>
-          </p:cNvPr>
-          <p:cNvSpPr txBox="1"/>
-          <p:nvPr/>
-        </p:nvSpPr>
-        <p:spPr>
-          <a:xfrm>
-            <a:off x="2924715" y="-383501"/>
-            <a:ext cx="1174323" cy="646587"/>
-          </a:xfrm>
-          <a:prstGeom prst="rect">
-            <a:avLst/>
-          </a:prstGeom>
-          <a:noFill/>
-        </p:spPr>
-        <p:txBody>
-          <a:bodyPr wrap="square" rtlCol="0">
-            <a:spAutoFit/>
-          </a:bodyPr>
-          <a:lstStyle/>
-          <a:p>
-            <a:pPr algn="r"/>
-            <a:r>
-              <a:rPr lang="en-SG" sz="1801" dirty="0" smtClean="0"/>
-              <a:t>[is loose match]</a:t>
-            </a:r>
-            <a:endParaRPr lang="en-SG" sz="1801" dirty="0"/>
-          </a:p>
-        </p:txBody>
-      </p:sp>
-      <p:sp>
-        <p:nvSpPr>
-          <p:cNvPr id="20" name="TextBox 19">
-            <a:extLst>
-              <a:ext uri="{FF2B5EF4-FFF2-40B4-BE49-F238E27FC236}">
-                <a16:creationId xmlns:a16="http://schemas.microsoft.com/office/drawing/2014/main" id="{950BB788-4B9F-4654-A5F0-F380DA681824}"/>
-              </a:ext>
-            </a:extLst>
-          </p:cNvPr>
-          <p:cNvSpPr txBox="1"/>
-          <p:nvPr/>
-        </p:nvSpPr>
-        <p:spPr>
-          <a:xfrm>
-            <a:off x="2924715" y="1635703"/>
-            <a:ext cx="853127" cy="369460"/>
-          </a:xfrm>
-          <a:prstGeom prst="rect">
-            <a:avLst/>
-          </a:prstGeom>
-          <a:noFill/>
-        </p:spPr>
-        <p:txBody>
-          <a:bodyPr wrap="square" rtlCol="0">
-            <a:spAutoFit/>
-          </a:bodyPr>
-          <a:lstStyle/>
-          <a:p>
-            <a:pPr algn="r"/>
-            <a:r>
-              <a:rPr lang="en-SG" sz="1801" dirty="0"/>
-              <a:t>[else]</a:t>
-            </a:r>
-          </a:p>
-        </p:txBody>
-      </p:sp>
-      <p:sp>
-        <p:nvSpPr>
-          <p:cNvPr id="22" name="Rectangle: Rounded Corners 21">
-            <a:extLst>
-              <a:ext uri="{FF2B5EF4-FFF2-40B4-BE49-F238E27FC236}">
-                <a16:creationId xmlns:a16="http://schemas.microsoft.com/office/drawing/2014/main" id="{A323A4FC-FF89-4B75-A4E8-6FA28B7DCA83}"/>
+          <p:cNvPr id="35" name="Rectangle: Rounded Corners 7">
+            <a:extLst>
+              <a:ext uri="{FF2B5EF4-FFF2-40B4-BE49-F238E27FC236}">
+                <a16:creationId xmlns:a16="http://schemas.microsoft.com/office/drawing/2014/main" id="{C13E6F3C-30CD-49FB-94D8-AF011F54E935}"/>
               </a:ext>
             </a:extLst>
           </p:cNvPr>
@@ -3715,8 +3829,8 @@
         </p:nvSpPr>
         <p:spPr>
           <a:xfrm>
-            <a:off x="4053574" y="-9478"/>
-            <a:ext cx="2187019" cy="527900"/>
+            <a:off x="-207096" y="2877927"/>
+            <a:ext cx="2187019" cy="716437"/>
           </a:xfrm>
           <a:prstGeom prst="roundRect">
             <a:avLst/>
@@ -3724,13 +3838,13 @@
         </p:spPr>
         <p:style>
           <a:lnRef idx="1">
-            <a:schemeClr val="accent4"/>
+            <a:schemeClr val="accent2"/>
           </a:lnRef>
           <a:fillRef idx="2">
-            <a:schemeClr val="accent4"/>
+            <a:schemeClr val="accent2"/>
           </a:fillRef>
           <a:effectRef idx="1">
-            <a:schemeClr val="accent4"/>
+            <a:schemeClr val="accent2"/>
           </a:effectRef>
           <a:fontRef idx="minor">
             <a:schemeClr val="dk1"/>
@@ -3748,7 +3862,7 @@
             <a:pPr algn="ctr"/>
             <a:r>
               <a:rPr lang="en-SG" sz="1801" dirty="0" smtClean="0"/>
-              <a:t>Add person to list</a:t>
+              <a:t>Application goes through all contacts</a:t>
             </a:r>
             <a:endParaRPr lang="en-SG" sz="1801" dirty="0"/>
           </a:p>
@@ -3756,26 +3870,31 @@
       </p:sp>
       <p:cxnSp>
         <p:nvCxnSpPr>
-          <p:cNvPr id="23" name="Straight Connector 22">
-            <a:extLst>
-              <a:ext uri="{FF2B5EF4-FFF2-40B4-BE49-F238E27FC236}">
-                <a16:creationId xmlns:a16="http://schemas.microsoft.com/office/drawing/2014/main" id="{976EB2B1-1493-46AA-8AF8-DC04DBB508E9}"/>
+          <p:cNvPr id="41" name="Straight Arrow Connector 40">
+            <a:extLst>
+              <a:ext uri="{FF2B5EF4-FFF2-40B4-BE49-F238E27FC236}">
+                <a16:creationId xmlns:a16="http://schemas.microsoft.com/office/drawing/2014/main" id="{6A0B3198-7B18-417D-A041-B13DF5BAE7A6}"/>
               </a:ext>
             </a:extLst>
           </p:cNvPr>
           <p:cNvCxnSpPr>
             <a:cxnSpLocks/>
+            <a:stCxn id="35" idx="3"/>
+            <a:endCxn id="40" idx="1"/>
           </p:cNvCxnSpPr>
           <p:nvPr/>
         </p:nvCxnSpPr>
         <p:spPr>
-          <a:xfrm>
-            <a:off x="3695239" y="254472"/>
-            <a:ext cx="0" cy="564242"/>
-          </a:xfrm>
-          <a:prstGeom prst="line">
+          <a:xfrm flipV="1">
+            <a:off x="1979923" y="3236143"/>
+            <a:ext cx="646534" cy="3"/>
+          </a:xfrm>
+          <a:prstGeom prst="straightConnector1">
             <a:avLst/>
           </a:prstGeom>
+          <a:ln>
+            <a:tailEnd type="triangle"/>
+          </a:ln>
         </p:spPr>
         <p:style>
           <a:lnRef idx="1">
@@ -3794,10 +3913,10 @@
       </p:cxnSp>
       <p:sp>
         <p:nvSpPr>
-          <p:cNvPr id="26" name="Diamond 25">
-            <a:extLst>
-              <a:ext uri="{FF2B5EF4-FFF2-40B4-BE49-F238E27FC236}">
-                <a16:creationId xmlns:a16="http://schemas.microsoft.com/office/drawing/2014/main" id="{CEFA5E0B-0718-4C33-83E9-398CBD71772D}"/>
+          <p:cNvPr id="144" name="Diamond 143">
+            <a:extLst>
+              <a:ext uri="{FF2B5EF4-FFF2-40B4-BE49-F238E27FC236}">
+                <a16:creationId xmlns:a16="http://schemas.microsoft.com/office/drawing/2014/main" id="{8E8723C3-03E7-46BE-8211-AAF9ADC7B033}"/>
               </a:ext>
             </a:extLst>
           </p:cNvPr>
@@ -3805,8 +3924,130 @@
           <p:nvPr/>
         </p:nvSpPr>
         <p:spPr>
-          <a:xfrm rot="16200000">
-            <a:off x="6348964" y="818714"/>
+          <a:xfrm rot="5400000">
+            <a:off x="7983011" y="2995760"/>
+            <a:ext cx="480766" cy="480766"/>
+          </a:xfrm>
+          <a:prstGeom prst="diamond">
+            <a:avLst/>
+          </a:prstGeom>
+        </p:spPr>
+        <p:style>
+          <a:lnRef idx="1">
+            <a:schemeClr val="accent6"/>
+          </a:lnRef>
+          <a:fillRef idx="2">
+            <a:schemeClr val="accent6"/>
+          </a:fillRef>
+          <a:effectRef idx="1">
+            <a:schemeClr val="accent6"/>
+          </a:effectRef>
+          <a:fontRef idx="minor">
+            <a:schemeClr val="dk1"/>
+          </a:fontRef>
+        </p:style>
+        <p:txBody>
+          <a:bodyPr rot="0" spcFirstLastPara="0" vertOverflow="overflow" horzOverflow="overflow" vert="horz" wrap="square" lIns="91440" tIns="45721" rIns="91440" bIns="45721" numCol="1" spcCol="0" rtlCol="0" fromWordArt="0" anchor="ctr" anchorCtr="0" forceAA="0" compatLnSpc="1">
+            <a:prstTxWarp prst="textNoShape">
+              <a:avLst/>
+            </a:prstTxWarp>
+            <a:noAutofit/>
+          </a:bodyPr>
+          <a:lstStyle/>
+          <a:p>
+            <a:pPr algn="ctr"/>
+            <a:endParaRPr lang="en-SG" sz="1801"/>
+          </a:p>
+        </p:txBody>
+      </p:sp>
+      <p:sp>
+        <p:nvSpPr>
+          <p:cNvPr id="146" name="TextBox 145">
+            <a:extLst>
+              <a:ext uri="{FF2B5EF4-FFF2-40B4-BE49-F238E27FC236}">
+                <a16:creationId xmlns:a16="http://schemas.microsoft.com/office/drawing/2014/main" id="{3ABD3846-DF71-49C4-AE22-6CE1C8B39149}"/>
+              </a:ext>
+            </a:extLst>
+          </p:cNvPr>
+          <p:cNvSpPr txBox="1"/>
+          <p:nvPr/>
+        </p:nvSpPr>
+        <p:spPr>
+          <a:xfrm>
+            <a:off x="7788182" y="1667643"/>
+            <a:ext cx="1985552" cy="369460"/>
+          </a:xfrm>
+          <a:prstGeom prst="rect">
+            <a:avLst/>
+          </a:prstGeom>
+          <a:noFill/>
+        </p:spPr>
+        <p:txBody>
+          <a:bodyPr wrap="square" rtlCol="0">
+            <a:spAutoFit/>
+          </a:bodyPr>
+          <a:lstStyle/>
+          <a:p>
+            <a:pPr algn="r"/>
+            <a:r>
+              <a:rPr lang="en-SG" sz="1801" dirty="0" smtClean="0"/>
+              <a:t>[is exact match]</a:t>
+            </a:r>
+            <a:endParaRPr lang="en-SG" sz="1801" dirty="0"/>
+          </a:p>
+        </p:txBody>
+      </p:sp>
+      <p:sp>
+        <p:nvSpPr>
+          <p:cNvPr id="147" name="TextBox 146">
+            <a:extLst>
+              <a:ext uri="{FF2B5EF4-FFF2-40B4-BE49-F238E27FC236}">
+                <a16:creationId xmlns:a16="http://schemas.microsoft.com/office/drawing/2014/main" id="{950BB788-4B9F-4654-A5F0-F380DA681824}"/>
+              </a:ext>
+            </a:extLst>
+          </p:cNvPr>
+          <p:cNvSpPr txBox="1"/>
+          <p:nvPr/>
+        </p:nvSpPr>
+        <p:spPr>
+          <a:xfrm>
+            <a:off x="9728741" y="2856853"/>
+            <a:ext cx="853127" cy="369460"/>
+          </a:xfrm>
+          <a:prstGeom prst="rect">
+            <a:avLst/>
+          </a:prstGeom>
+          <a:noFill/>
+        </p:spPr>
+        <p:txBody>
+          <a:bodyPr wrap="square" rtlCol="0">
+            <a:spAutoFit/>
+          </a:bodyPr>
+          <a:lstStyle/>
+          <a:p>
+            <a:pPr algn="r"/>
+            <a:r>
+              <a:rPr lang="en-SG" sz="1801" dirty="0"/>
+              <a:t>[else]</a:t>
+            </a:r>
+          </a:p>
+        </p:txBody>
+      </p:sp>
+      <p:sp>
+        <p:nvSpPr>
+          <p:cNvPr id="183" name="Diamond 182">
+            <a:extLst>
+              <a:ext uri="{FF2B5EF4-FFF2-40B4-BE49-F238E27FC236}">
+                <a16:creationId xmlns:a16="http://schemas.microsoft.com/office/drawing/2014/main" id="{8E8723C3-03E7-46BE-8211-AAF9ADC7B033}"/>
+              </a:ext>
+            </a:extLst>
+          </p:cNvPr>
+          <p:cNvSpPr/>
+          <p:nvPr/>
+        </p:nvSpPr>
+        <p:spPr>
+          <a:xfrm rot="5400000">
+            <a:off x="12083107" y="2990845"/>
             <a:ext cx="480766" cy="480766"/>
           </a:xfrm>
           <a:prstGeom prst="diamond">
@@ -3841,28 +4082,194 @@
           </a:p>
         </p:txBody>
       </p:sp>
+      <p:sp>
+        <p:nvSpPr>
+          <p:cNvPr id="185" name="TextBox 184">
+            <a:extLst>
+              <a:ext uri="{FF2B5EF4-FFF2-40B4-BE49-F238E27FC236}">
+                <a16:creationId xmlns:a16="http://schemas.microsoft.com/office/drawing/2014/main" id="{3ABD3846-DF71-49C4-AE22-6CE1C8B39149}"/>
+              </a:ext>
+            </a:extLst>
+          </p:cNvPr>
+          <p:cNvSpPr txBox="1"/>
+          <p:nvPr/>
+        </p:nvSpPr>
+        <p:spPr>
+          <a:xfrm>
+            <a:off x="9914090" y="420582"/>
+            <a:ext cx="2909266" cy="369460"/>
+          </a:xfrm>
+          <a:prstGeom prst="rect">
+            <a:avLst/>
+          </a:prstGeom>
+          <a:noFill/>
+        </p:spPr>
+        <p:txBody>
+          <a:bodyPr wrap="square" rtlCol="0">
+            <a:spAutoFit/>
+          </a:bodyPr>
+          <a:lstStyle/>
+          <a:p>
+            <a:r>
+              <a:rPr lang="en-SG" sz="1801" dirty="0" smtClean="0"/>
+              <a:t>[match other conditions]</a:t>
+            </a:r>
+            <a:endParaRPr lang="en-SG" sz="1801" dirty="0"/>
+          </a:p>
+        </p:txBody>
+      </p:sp>
+      <p:sp>
+        <p:nvSpPr>
+          <p:cNvPr id="186" name="TextBox 185">
+            <a:extLst>
+              <a:ext uri="{FF2B5EF4-FFF2-40B4-BE49-F238E27FC236}">
+                <a16:creationId xmlns:a16="http://schemas.microsoft.com/office/drawing/2014/main" id="{950BB788-4B9F-4654-A5F0-F380DA681824}"/>
+              </a:ext>
+            </a:extLst>
+          </p:cNvPr>
+          <p:cNvSpPr txBox="1"/>
+          <p:nvPr/>
+        </p:nvSpPr>
+        <p:spPr>
+          <a:xfrm>
+            <a:off x="11550019" y="3399779"/>
+            <a:ext cx="853127" cy="369460"/>
+          </a:xfrm>
+          <a:prstGeom prst="rect">
+            <a:avLst/>
+          </a:prstGeom>
+          <a:noFill/>
+        </p:spPr>
+        <p:txBody>
+          <a:bodyPr wrap="square" rtlCol="0">
+            <a:spAutoFit/>
+          </a:bodyPr>
+          <a:lstStyle/>
+          <a:p>
+            <a:pPr algn="r"/>
+            <a:r>
+              <a:rPr lang="en-SG" sz="1801" dirty="0"/>
+              <a:t>[else]</a:t>
+            </a:r>
+          </a:p>
+        </p:txBody>
+      </p:sp>
       <p:cxnSp>
         <p:nvCxnSpPr>
-          <p:cNvPr id="36" name="Straight Connector 35">
-            <a:extLst>
-              <a:ext uri="{FF2B5EF4-FFF2-40B4-BE49-F238E27FC236}">
-                <a16:creationId xmlns:a16="http://schemas.microsoft.com/office/drawing/2014/main" id="{98847C5E-DAA5-4B06-82D4-86A7D99EB069}"/>
+          <p:cNvPr id="193" name="Straight Arrow Connector 192">
+            <a:extLst>
+              <a:ext uri="{FF2B5EF4-FFF2-40B4-BE49-F238E27FC236}">
+                <a16:creationId xmlns:a16="http://schemas.microsoft.com/office/drawing/2014/main" id="{6A0B3198-7B18-417D-A041-B13DF5BAE7A6}"/>
               </a:ext>
             </a:extLst>
           </p:cNvPr>
           <p:cNvCxnSpPr>
             <a:cxnSpLocks/>
+            <a:stCxn id="144" idx="0"/>
+            <a:endCxn id="183" idx="2"/>
           </p:cNvCxnSpPr>
           <p:nvPr/>
         </p:nvCxnSpPr>
         <p:spPr>
-          <a:xfrm flipH="1">
-            <a:off x="3695239" y="1967789"/>
-            <a:ext cx="2894108" cy="4138"/>
-          </a:xfrm>
-          <a:prstGeom prst="line">
+          <a:xfrm flipV="1">
+            <a:off x="8463777" y="3231228"/>
+            <a:ext cx="3619330" cy="4915"/>
+          </a:xfrm>
+          <a:prstGeom prst="straightConnector1">
             <a:avLst/>
           </a:prstGeom>
+          <a:ln>
+            <a:tailEnd type="triangle"/>
+          </a:ln>
+        </p:spPr>
+        <p:style>
+          <a:lnRef idx="1">
+            <a:schemeClr val="dk1"/>
+          </a:lnRef>
+          <a:fillRef idx="0">
+            <a:schemeClr val="dk1"/>
+          </a:fillRef>
+          <a:effectRef idx="0">
+            <a:schemeClr val="dk1"/>
+          </a:effectRef>
+          <a:fontRef idx="minor">
+            <a:schemeClr val="tx1"/>
+          </a:fontRef>
+        </p:style>
+      </p:cxnSp>
+      <p:sp>
+        <p:nvSpPr>
+          <p:cNvPr id="50" name="Rectangle: Rounded Corners 21">
+            <a:extLst>
+              <a:ext uri="{FF2B5EF4-FFF2-40B4-BE49-F238E27FC236}">
+                <a16:creationId xmlns:a16="http://schemas.microsoft.com/office/drawing/2014/main" id="{A323A4FC-FF89-4B75-A4E8-6FA28B7DCA83}"/>
+              </a:ext>
+            </a:extLst>
+          </p:cNvPr>
+          <p:cNvSpPr/>
+          <p:nvPr/>
+        </p:nvSpPr>
+        <p:spPr>
+          <a:xfrm>
+            <a:off x="7129884" y="526093"/>
+            <a:ext cx="2187019" cy="527900"/>
+          </a:xfrm>
+          <a:prstGeom prst="roundRect">
+            <a:avLst/>
+          </a:prstGeom>
+        </p:spPr>
+        <p:style>
+          <a:lnRef idx="1">
+            <a:schemeClr val="accent4"/>
+          </a:lnRef>
+          <a:fillRef idx="2">
+            <a:schemeClr val="accent4"/>
+          </a:fillRef>
+          <a:effectRef idx="1">
+            <a:schemeClr val="accent4"/>
+          </a:effectRef>
+          <a:fontRef idx="minor">
+            <a:schemeClr val="dk1"/>
+          </a:fontRef>
+        </p:style>
+        <p:txBody>
+          <a:bodyPr rot="0" spcFirstLastPara="0" vertOverflow="overflow" horzOverflow="overflow" vert="horz" wrap="square" lIns="91440" tIns="45721" rIns="91440" bIns="45721" numCol="1" spcCol="0" rtlCol="0" fromWordArt="0" anchor="ctr" anchorCtr="0" forceAA="0" compatLnSpc="1">
+            <a:prstTxWarp prst="textNoShape">
+              <a:avLst/>
+            </a:prstTxWarp>
+            <a:noAutofit/>
+          </a:bodyPr>
+          <a:lstStyle/>
+          <a:p>
+            <a:pPr algn="ctr"/>
+            <a:r>
+              <a:rPr lang="en-SG" sz="1801" dirty="0" smtClean="0"/>
+              <a:t>Add person to list</a:t>
+            </a:r>
+            <a:endParaRPr lang="en-SG" sz="1801" dirty="0"/>
+          </a:p>
+        </p:txBody>
+      </p:sp>
+      <p:cxnSp>
+        <p:nvCxnSpPr>
+          <p:cNvPr id="3" name="Elbow Connector 2"/>
+          <p:cNvCxnSpPr>
+            <a:stCxn id="12" idx="1"/>
+            <a:endCxn id="50" idx="1"/>
+          </p:cNvCxnSpPr>
+          <p:nvPr/>
+        </p:nvCxnSpPr>
+        <p:spPr>
+          <a:xfrm rot="5400000" flipH="1" flipV="1">
+            <a:off x="4989013" y="854890"/>
+            <a:ext cx="2205717" cy="2076025"/>
+          </a:xfrm>
+          <a:prstGeom prst="bentConnector2">
+            <a:avLst/>
+          </a:prstGeom>
+          <a:ln w="6350">
+            <a:tailEnd type="triangle"/>
+          </a:ln>
         </p:spPr>
         <p:style>
           <a:lnRef idx="1">
@@ -3881,28 +4288,22 @@
       </p:cxnSp>
       <p:cxnSp>
         <p:nvCxnSpPr>
-          <p:cNvPr id="39" name="Straight Arrow Connector 38">
-            <a:extLst>
-              <a:ext uri="{FF2B5EF4-FFF2-40B4-BE49-F238E27FC236}">
-                <a16:creationId xmlns:a16="http://schemas.microsoft.com/office/drawing/2014/main" id="{07205C61-8174-4C37-BC30-E1E54EBEAF6C}"/>
-              </a:ext>
-            </a:extLst>
-          </p:cNvPr>
+          <p:cNvPr id="61" name="Elbow Connector 60"/>
           <p:cNvCxnSpPr>
-            <a:cxnSpLocks/>
-            <a:endCxn id="26" idx="1"/>
+            <a:stCxn id="183" idx="1"/>
+            <a:endCxn id="50" idx="3"/>
           </p:cNvCxnSpPr>
           <p:nvPr/>
         </p:nvCxnSpPr>
         <p:spPr>
-          <a:xfrm flipV="1">
-            <a:off x="6589347" y="1299480"/>
-            <a:ext cx="0" cy="668309"/>
-          </a:xfrm>
-          <a:prstGeom prst="straightConnector1">
+          <a:xfrm rot="16200000" flipV="1">
+            <a:off x="9719796" y="387150"/>
+            <a:ext cx="2200802" cy="3006587"/>
+          </a:xfrm>
+          <a:prstGeom prst="bentConnector2">
             <a:avLst/>
           </a:prstGeom>
-          <a:ln>
+          <a:ln w="6350">
             <a:tailEnd type="triangle"/>
           </a:ln>
         </p:spPr>
@@ -3923,27 +4324,131 @@
       </p:cxnSp>
       <p:cxnSp>
         <p:nvCxnSpPr>
-          <p:cNvPr id="52" name="Straight Connector 51">
-            <a:extLst>
-              <a:ext uri="{FF2B5EF4-FFF2-40B4-BE49-F238E27FC236}">
-                <a16:creationId xmlns:a16="http://schemas.microsoft.com/office/drawing/2014/main" id="{4E0125F5-2933-475D-8E22-23FB92F10BB9}"/>
+          <p:cNvPr id="80" name="Straight Arrow Connector 79">
+            <a:extLst>
+              <a:ext uri="{FF2B5EF4-FFF2-40B4-BE49-F238E27FC236}">
+                <a16:creationId xmlns:a16="http://schemas.microsoft.com/office/drawing/2014/main" id="{07205C61-8174-4C37-BC30-E1E54EBEAF6C}"/>
               </a:ext>
             </a:extLst>
           </p:cNvPr>
           <p:cNvCxnSpPr>
             <a:cxnSpLocks/>
-            <a:stCxn id="22" idx="1"/>
+            <a:stCxn id="144" idx="1"/>
+            <a:endCxn id="50" idx="2"/>
           </p:cNvCxnSpPr>
           <p:nvPr/>
         </p:nvCxnSpPr>
         <p:spPr>
-          <a:xfrm flipH="1">
-            <a:off x="3695239" y="254472"/>
-            <a:ext cx="358335" cy="0"/>
-          </a:xfrm>
-          <a:prstGeom prst="line">
+          <a:xfrm flipV="1">
+            <a:off x="8223394" y="1053993"/>
+            <a:ext cx="0" cy="1941767"/>
+          </a:xfrm>
+          <a:prstGeom prst="straightConnector1">
             <a:avLst/>
           </a:prstGeom>
+          <a:ln>
+            <a:tailEnd type="triangle"/>
+          </a:ln>
+        </p:spPr>
+        <p:style>
+          <a:lnRef idx="1">
+            <a:schemeClr val="dk1"/>
+          </a:lnRef>
+          <a:fillRef idx="0">
+            <a:schemeClr val="dk1"/>
+          </a:fillRef>
+          <a:effectRef idx="0">
+            <a:schemeClr val="dk1"/>
+          </a:effectRef>
+          <a:fontRef idx="minor">
+            <a:schemeClr val="tx1"/>
+          </a:fontRef>
+        </p:style>
+      </p:cxnSp>
+      <p:sp>
+        <p:nvSpPr>
+          <p:cNvPr id="40" name="Rectangle: Rounded Corners 7">
+            <a:extLst>
+              <a:ext uri="{FF2B5EF4-FFF2-40B4-BE49-F238E27FC236}">
+                <a16:creationId xmlns:a16="http://schemas.microsoft.com/office/drawing/2014/main" id="{C13E6F3C-30CD-49FB-94D8-AF011F54E935}"/>
+              </a:ext>
+            </a:extLst>
+          </p:cNvPr>
+          <p:cNvSpPr/>
+          <p:nvPr/>
+        </p:nvSpPr>
+        <p:spPr>
+          <a:xfrm>
+            <a:off x="2626457" y="2303940"/>
+            <a:ext cx="1534273" cy="1864405"/>
+          </a:xfrm>
+          <a:prstGeom prst="roundRect">
+            <a:avLst/>
+          </a:prstGeom>
+        </p:spPr>
+        <p:style>
+          <a:lnRef idx="1">
+            <a:schemeClr val="accent2"/>
+          </a:lnRef>
+          <a:fillRef idx="2">
+            <a:schemeClr val="accent2"/>
+          </a:fillRef>
+          <a:effectRef idx="1">
+            <a:schemeClr val="accent2"/>
+          </a:effectRef>
+          <a:fontRef idx="minor">
+            <a:schemeClr val="dk1"/>
+          </a:fontRef>
+        </p:style>
+        <p:txBody>
+          <a:bodyPr rot="0" spcFirstLastPara="0" vertOverflow="overflow" horzOverflow="overflow" vert="horz" wrap="square" lIns="91440" tIns="45721" rIns="91440" bIns="45721" numCol="1" spcCol="0" rtlCol="0" fromWordArt="0" anchor="ctr" anchorCtr="0" forceAA="0" compatLnSpc="1">
+            <a:prstTxWarp prst="textNoShape">
+              <a:avLst/>
+            </a:prstTxWarp>
+            <a:noAutofit/>
+          </a:bodyPr>
+          <a:lstStyle/>
+          <a:p>
+            <a:pPr algn="ctr"/>
+            <a:r>
+              <a:rPr lang="en-SG" sz="1801" dirty="0" smtClean="0"/>
+              <a:t>Application goes through all </a:t>
+            </a:r>
+            <a:r>
+              <a:rPr lang="en-SG" sz="1801" dirty="0" smtClean="0"/>
+              <a:t>name words of a contact</a:t>
+            </a:r>
+            <a:endParaRPr lang="en-SG" sz="1801" dirty="0"/>
+          </a:p>
+        </p:txBody>
+      </p:sp>
+      <p:cxnSp>
+        <p:nvCxnSpPr>
+          <p:cNvPr id="43" name="Straight Arrow Connector 42">
+            <a:extLst>
+              <a:ext uri="{FF2B5EF4-FFF2-40B4-BE49-F238E27FC236}">
+                <a16:creationId xmlns:a16="http://schemas.microsoft.com/office/drawing/2014/main" id="{6A0B3198-7B18-417D-A041-B13DF5BAE7A6}"/>
+              </a:ext>
+            </a:extLst>
+          </p:cNvPr>
+          <p:cNvCxnSpPr>
+            <a:cxnSpLocks/>
+            <a:stCxn id="40" idx="3"/>
+            <a:endCxn id="12" idx="2"/>
+          </p:cNvCxnSpPr>
+          <p:nvPr/>
+        </p:nvCxnSpPr>
+        <p:spPr>
+          <a:xfrm>
+            <a:off x="4160730" y="3236143"/>
+            <a:ext cx="652746" cy="0"/>
+          </a:xfrm>
+          <a:prstGeom prst="straightConnector1">
+            <a:avLst/>
+          </a:prstGeom>
+          <a:ln>
+            <a:tailEnd type="triangle"/>
+          </a:ln>
         </p:spPr>
         <p:style>
           <a:lnRef idx="1">
@@ -3962,27 +4467,62 @@
       </p:cxnSp>
       <p:cxnSp>
         <p:nvCxnSpPr>
-          <p:cNvPr id="69" name="Straight Arrow Connector 68">
-            <a:extLst>
-              <a:ext uri="{FF2B5EF4-FFF2-40B4-BE49-F238E27FC236}">
-                <a16:creationId xmlns:a16="http://schemas.microsoft.com/office/drawing/2014/main" id="{7BE2639B-14BA-4C9C-9964-899CEF3278C9}"/>
-              </a:ext>
-            </a:extLst>
-          </p:cNvPr>
+          <p:cNvPr id="26" name="Elbow Connector 25"/>
           <p:cNvCxnSpPr>
-            <a:cxnSpLocks/>
-            <a:stCxn id="189" idx="2"/>
-            <a:endCxn id="68" idx="2"/>
+            <a:stCxn id="50" idx="0"/>
+            <a:endCxn id="40" idx="1"/>
           </p:cNvCxnSpPr>
           <p:nvPr/>
         </p:nvCxnSpPr>
         <p:spPr>
-          <a:xfrm>
-            <a:off x="15031690" y="1054182"/>
-            <a:ext cx="772223" cy="0"/>
-          </a:xfrm>
-          <a:prstGeom prst="straightConnector1">
-            <a:avLst/>
+          <a:xfrm rot="16200000" flipH="1" flipV="1">
+            <a:off x="4069901" y="-917351"/>
+            <a:ext cx="2710050" cy="5596937"/>
+          </a:xfrm>
+          <a:prstGeom prst="bentConnector4">
+            <a:avLst>
+              <a:gd name="adj1" fmla="val -34568"/>
+              <a:gd name="adj2" fmla="val 106807"/>
+            </a:avLst>
+          </a:prstGeom>
+          <a:ln>
+            <a:tailEnd type="triangle"/>
+          </a:ln>
+        </p:spPr>
+        <p:style>
+          <a:lnRef idx="1">
+            <a:schemeClr val="dk1"/>
+          </a:lnRef>
+          <a:fillRef idx="0">
+            <a:schemeClr val="dk1"/>
+          </a:fillRef>
+          <a:effectRef idx="0">
+            <a:schemeClr val="dk1"/>
+          </a:effectRef>
+          <a:fontRef idx="minor">
+            <a:schemeClr val="tx1"/>
+          </a:fontRef>
+        </p:style>
+      </p:cxnSp>
+      <p:cxnSp>
+        <p:nvCxnSpPr>
+          <p:cNvPr id="32" name="Elbow Connector 31"/>
+          <p:cNvCxnSpPr>
+            <a:stCxn id="183" idx="3"/>
+            <a:endCxn id="40" idx="1"/>
+          </p:cNvCxnSpPr>
+          <p:nvPr/>
+        </p:nvCxnSpPr>
+        <p:spPr>
+          <a:xfrm rot="5400000" flipH="1">
+            <a:off x="7357240" y="-1494639"/>
+            <a:ext cx="235468" cy="9697033"/>
+          </a:xfrm>
+          <a:prstGeom prst="bentConnector4">
+            <a:avLst>
+              <a:gd name="adj1" fmla="val -537651"/>
+              <a:gd name="adj2" fmla="val 103927"/>
+            </a:avLst>
           </a:prstGeom>
           <a:ln>
             <a:tailEnd type="triangle"/>
@@ -4005,7 +4545,7 @@
       </p:cxnSp>
       <p:grpSp>
         <p:nvGrpSpPr>
-          <p:cNvPr id="75" name="Group 74">
+          <p:cNvPr id="58" name="Group 57">
             <a:extLst>
               <a:ext uri="{FF2B5EF4-FFF2-40B4-BE49-F238E27FC236}">
                 <a16:creationId xmlns:a16="http://schemas.microsoft.com/office/drawing/2014/main" id="{A48F4168-7D41-4ED6-97F1-58289DDE3C4D}"/>
@@ -4017,7 +4557,7 @@
         </p:nvGrpSpPr>
         <p:grpSpPr>
           <a:xfrm>
-            <a:off x="15803913" y="936347"/>
+            <a:off x="14664269" y="2014684"/>
             <a:ext cx="235669" cy="235669"/>
             <a:chOff x="8040730" y="5082186"/>
             <a:chExt cx="235669" cy="235669"/>
@@ -4025,7 +4565,7 @@
         </p:grpSpPr>
         <p:sp>
           <p:nvSpPr>
-            <p:cNvPr id="68" name="Oval 67">
+            <p:cNvPr id="59" name="Oval 58">
               <a:extLst>
                 <a:ext uri="{FF2B5EF4-FFF2-40B4-BE49-F238E27FC236}">
                   <a16:creationId xmlns:a16="http://schemas.microsoft.com/office/drawing/2014/main" id="{E423C8D7-553D-4A16-BA68-78DB113CAEC3}"/>
@@ -4077,7 +4617,7 @@
         </p:sp>
         <p:sp>
           <p:nvSpPr>
-            <p:cNvPr id="71" name="Oval 70">
+            <p:cNvPr id="60" name="Oval 59">
               <a:extLst>
                 <a:ext uri="{FF2B5EF4-FFF2-40B4-BE49-F238E27FC236}">
                   <a16:creationId xmlns:a16="http://schemas.microsoft.com/office/drawing/2014/main" id="{1F41AA13-1BFC-498E-BBC4-DC32053E38E1}"/>
@@ -4125,62 +4665,9 @@
           </p:txBody>
         </p:sp>
       </p:grpSp>
-      <p:sp>
-        <p:nvSpPr>
-          <p:cNvPr id="35" name="Rectangle: Rounded Corners 7">
-            <a:extLst>
-              <a:ext uri="{FF2B5EF4-FFF2-40B4-BE49-F238E27FC236}">
-                <a16:creationId xmlns:a16="http://schemas.microsoft.com/office/drawing/2014/main" id="{C13E6F3C-30CD-49FB-94D8-AF011F54E935}"/>
-              </a:ext>
-            </a:extLst>
-          </p:cNvPr>
-          <p:cNvSpPr/>
-          <p:nvPr/>
-        </p:nvSpPr>
-        <p:spPr>
-          <a:xfrm>
-            <a:off x="535854" y="706227"/>
-            <a:ext cx="2187019" cy="716437"/>
-          </a:xfrm>
-          <a:prstGeom prst="roundRect">
-            <a:avLst/>
-          </a:prstGeom>
-        </p:spPr>
-        <p:style>
-          <a:lnRef idx="1">
-            <a:schemeClr val="accent2"/>
-          </a:lnRef>
-          <a:fillRef idx="2">
-            <a:schemeClr val="accent2"/>
-          </a:fillRef>
-          <a:effectRef idx="1">
-            <a:schemeClr val="accent2"/>
-          </a:effectRef>
-          <a:fontRef idx="minor">
-            <a:schemeClr val="dk1"/>
-          </a:fontRef>
-        </p:style>
-        <p:txBody>
-          <a:bodyPr rot="0" spcFirstLastPara="0" vertOverflow="overflow" horzOverflow="overflow" vert="horz" wrap="square" lIns="91440" tIns="45721" rIns="91440" bIns="45721" numCol="1" spcCol="0" rtlCol="0" fromWordArt="0" anchor="ctr" anchorCtr="0" forceAA="0" compatLnSpc="1">
-            <a:prstTxWarp prst="textNoShape">
-              <a:avLst/>
-            </a:prstTxWarp>
-            <a:noAutofit/>
-          </a:bodyPr>
-          <a:lstStyle/>
-          <a:p>
-            <a:pPr algn="ctr"/>
-            <a:r>
-              <a:rPr lang="en-SG" sz="1801" dirty="0" smtClean="0"/>
-              <a:t>Application goes through all contacts</a:t>
-            </a:r>
-            <a:endParaRPr lang="en-SG" sz="1801" dirty="0"/>
-          </a:p>
-        </p:txBody>
-      </p:sp>
       <p:cxnSp>
         <p:nvCxnSpPr>
-          <p:cNvPr id="41" name="Straight Arrow Connector 40">
+          <p:cNvPr id="62" name="Straight Arrow Connector 61">
             <a:extLst>
               <a:ext uri="{FF2B5EF4-FFF2-40B4-BE49-F238E27FC236}">
                 <a16:creationId xmlns:a16="http://schemas.microsoft.com/office/drawing/2014/main" id="{6A0B3198-7B18-417D-A041-B13DF5BAE7A6}"/>
@@ -4189,14 +4676,15 @@
           </p:cNvPr>
           <p:cNvCxnSpPr>
             <a:cxnSpLocks/>
-            <a:stCxn id="35" idx="3"/>
+            <a:stCxn id="28" idx="3"/>
+            <a:endCxn id="59" idx="2"/>
           </p:cNvCxnSpPr>
           <p:nvPr/>
         </p:nvCxnSpPr>
         <p:spPr>
-          <a:xfrm flipV="1">
-            <a:off x="2722873" y="1059097"/>
-            <a:ext cx="731985" cy="5349"/>
+          <a:xfrm>
+            <a:off x="13742894" y="2132519"/>
+            <a:ext cx="921375" cy="0"/>
           </a:xfrm>
           <a:prstGeom prst="straightConnector1">
             <a:avLst/>
@@ -4204,1165 +4692,6 @@
           <a:ln>
             <a:tailEnd type="triangle"/>
           </a:ln>
-        </p:spPr>
-        <p:style>
-          <a:lnRef idx="1">
-            <a:schemeClr val="dk1"/>
-          </a:lnRef>
-          <a:fillRef idx="0">
-            <a:schemeClr val="dk1"/>
-          </a:fillRef>
-          <a:effectRef idx="0">
-            <a:schemeClr val="dk1"/>
-          </a:effectRef>
-          <a:fontRef idx="minor">
-            <a:schemeClr val="tx1"/>
-          </a:fontRef>
-        </p:style>
-      </p:cxnSp>
-      <p:cxnSp>
-        <p:nvCxnSpPr>
-          <p:cNvPr id="102" name="Straight Arrow Connector 101">
-            <a:extLst>
-              <a:ext uri="{FF2B5EF4-FFF2-40B4-BE49-F238E27FC236}">
-                <a16:creationId xmlns:a16="http://schemas.microsoft.com/office/drawing/2014/main" id="{F19B7A29-4E76-4FF6-AB20-F964D8CE510E}"/>
-              </a:ext>
-            </a:extLst>
-          </p:cNvPr>
-          <p:cNvCxnSpPr>
-            <a:cxnSpLocks/>
-            <a:endCxn id="26" idx="3"/>
-          </p:cNvCxnSpPr>
-          <p:nvPr/>
-        </p:nvCxnSpPr>
-        <p:spPr>
-          <a:xfrm>
-            <a:off x="6589347" y="254472"/>
-            <a:ext cx="0" cy="564242"/>
-          </a:xfrm>
-          <a:prstGeom prst="straightConnector1">
-            <a:avLst/>
-          </a:prstGeom>
-          <a:ln>
-            <a:tailEnd type="triangle"/>
-          </a:ln>
-        </p:spPr>
-        <p:style>
-          <a:lnRef idx="1">
-            <a:schemeClr val="dk1"/>
-          </a:lnRef>
-          <a:fillRef idx="0">
-            <a:schemeClr val="dk1"/>
-          </a:fillRef>
-          <a:effectRef idx="0">
-            <a:schemeClr val="dk1"/>
-          </a:effectRef>
-          <a:fontRef idx="minor">
-            <a:schemeClr val="tx1"/>
-          </a:fontRef>
-        </p:style>
-      </p:cxnSp>
-      <p:cxnSp>
-        <p:nvCxnSpPr>
-          <p:cNvPr id="103" name="Straight Connector 102">
-            <a:extLst>
-              <a:ext uri="{FF2B5EF4-FFF2-40B4-BE49-F238E27FC236}">
-                <a16:creationId xmlns:a16="http://schemas.microsoft.com/office/drawing/2014/main" id="{A5E6814F-A860-451B-9266-310BAEA7CDAC}"/>
-              </a:ext>
-            </a:extLst>
-          </p:cNvPr>
-          <p:cNvCxnSpPr>
-            <a:cxnSpLocks/>
-            <a:stCxn id="22" idx="3"/>
-          </p:cNvCxnSpPr>
-          <p:nvPr/>
-        </p:nvCxnSpPr>
-        <p:spPr>
-          <a:xfrm>
-            <a:off x="6240593" y="254472"/>
-            <a:ext cx="348754" cy="0"/>
-          </a:xfrm>
-          <a:prstGeom prst="line">
-            <a:avLst/>
-          </a:prstGeom>
-        </p:spPr>
-        <p:style>
-          <a:lnRef idx="1">
-            <a:schemeClr val="dk1"/>
-          </a:lnRef>
-          <a:fillRef idx="0">
-            <a:schemeClr val="dk1"/>
-          </a:fillRef>
-          <a:effectRef idx="0">
-            <a:schemeClr val="dk1"/>
-          </a:effectRef>
-          <a:fontRef idx="minor">
-            <a:schemeClr val="tx1"/>
-          </a:fontRef>
-        </p:style>
-      </p:cxnSp>
-      <p:sp>
-        <p:nvSpPr>
-          <p:cNvPr id="144" name="Diamond 143">
-            <a:extLst>
-              <a:ext uri="{FF2B5EF4-FFF2-40B4-BE49-F238E27FC236}">
-                <a16:creationId xmlns:a16="http://schemas.microsoft.com/office/drawing/2014/main" id="{8E8723C3-03E7-46BE-8211-AAF9ADC7B033}"/>
-              </a:ext>
-            </a:extLst>
-          </p:cNvPr>
-          <p:cNvSpPr/>
-          <p:nvPr/>
-        </p:nvSpPr>
-        <p:spPr>
-          <a:xfrm rot="5400000">
-            <a:off x="7556722" y="818714"/>
-            <a:ext cx="480766" cy="480766"/>
-          </a:xfrm>
-          <a:prstGeom prst="diamond">
-            <a:avLst/>
-          </a:prstGeom>
-        </p:spPr>
-        <p:style>
-          <a:lnRef idx="1">
-            <a:schemeClr val="accent6"/>
-          </a:lnRef>
-          <a:fillRef idx="2">
-            <a:schemeClr val="accent6"/>
-          </a:fillRef>
-          <a:effectRef idx="1">
-            <a:schemeClr val="accent6"/>
-          </a:effectRef>
-          <a:fontRef idx="minor">
-            <a:schemeClr val="dk1"/>
-          </a:fontRef>
-        </p:style>
-        <p:txBody>
-          <a:bodyPr rot="0" spcFirstLastPara="0" vertOverflow="overflow" horzOverflow="overflow" vert="horz" wrap="square" lIns="91440" tIns="45721" rIns="91440" bIns="45721" numCol="1" spcCol="0" rtlCol="0" fromWordArt="0" anchor="ctr" anchorCtr="0" forceAA="0" compatLnSpc="1">
-            <a:prstTxWarp prst="textNoShape">
-              <a:avLst/>
-            </a:prstTxWarp>
-            <a:noAutofit/>
-          </a:bodyPr>
-          <a:lstStyle/>
-          <a:p>
-            <a:pPr algn="ctr"/>
-            <a:endParaRPr lang="en-SG" sz="1801"/>
-          </a:p>
-        </p:txBody>
-      </p:sp>
-      <p:cxnSp>
-        <p:nvCxnSpPr>
-          <p:cNvPr id="145" name="Straight Connector 144">
-            <a:extLst>
-              <a:ext uri="{FF2B5EF4-FFF2-40B4-BE49-F238E27FC236}">
-                <a16:creationId xmlns:a16="http://schemas.microsoft.com/office/drawing/2014/main" id="{E9F9F46E-F315-4E20-BA19-DC5A481900A9}"/>
-              </a:ext>
-            </a:extLst>
-          </p:cNvPr>
-          <p:cNvCxnSpPr/>
-          <p:nvPr/>
-        </p:nvCxnSpPr>
-        <p:spPr>
-          <a:xfrm rot="5400000">
-            <a:off x="7460881" y="1635703"/>
-            <a:ext cx="672446" cy="1"/>
-          </a:xfrm>
-          <a:prstGeom prst="line">
-            <a:avLst/>
-          </a:prstGeom>
-        </p:spPr>
-        <p:style>
-          <a:lnRef idx="1">
-            <a:schemeClr val="dk1"/>
-          </a:lnRef>
-          <a:fillRef idx="0">
-            <a:schemeClr val="dk1"/>
-          </a:fillRef>
-          <a:effectRef idx="0">
-            <a:schemeClr val="dk1"/>
-          </a:effectRef>
-          <a:fontRef idx="minor">
-            <a:schemeClr val="tx1"/>
-          </a:fontRef>
-        </p:style>
-      </p:cxnSp>
-      <p:sp>
-        <p:nvSpPr>
-          <p:cNvPr id="146" name="TextBox 145">
-            <a:extLst>
-              <a:ext uri="{FF2B5EF4-FFF2-40B4-BE49-F238E27FC236}">
-                <a16:creationId xmlns:a16="http://schemas.microsoft.com/office/drawing/2014/main" id="{3ABD3846-DF71-49C4-AE22-6CE1C8B39149}"/>
-              </a:ext>
-            </a:extLst>
-          </p:cNvPr>
-          <p:cNvSpPr txBox="1"/>
-          <p:nvPr/>
-        </p:nvSpPr>
-        <p:spPr>
-          <a:xfrm>
-            <a:off x="6924245" y="-382166"/>
-            <a:ext cx="1286419" cy="646587"/>
-          </a:xfrm>
-          <a:prstGeom prst="rect">
-            <a:avLst/>
-          </a:prstGeom>
-          <a:noFill/>
-        </p:spPr>
-        <p:txBody>
-          <a:bodyPr wrap="square" rtlCol="0">
-            <a:spAutoFit/>
-          </a:bodyPr>
-          <a:lstStyle/>
-          <a:p>
-            <a:pPr algn="r"/>
-            <a:r>
-              <a:rPr lang="en-SG" sz="1801" dirty="0" smtClean="0"/>
-              <a:t>[is exact match]</a:t>
-            </a:r>
-            <a:endParaRPr lang="en-SG" sz="1801" dirty="0"/>
-          </a:p>
-        </p:txBody>
-      </p:sp>
-      <p:sp>
-        <p:nvSpPr>
-          <p:cNvPr id="147" name="TextBox 146">
-            <a:extLst>
-              <a:ext uri="{FF2B5EF4-FFF2-40B4-BE49-F238E27FC236}">
-                <a16:creationId xmlns:a16="http://schemas.microsoft.com/office/drawing/2014/main" id="{950BB788-4B9F-4654-A5F0-F380DA681824}"/>
-              </a:ext>
-            </a:extLst>
-          </p:cNvPr>
-          <p:cNvSpPr txBox="1"/>
-          <p:nvPr/>
-        </p:nvSpPr>
-        <p:spPr>
-          <a:xfrm>
-            <a:off x="7026579" y="1635703"/>
-            <a:ext cx="853127" cy="369460"/>
-          </a:xfrm>
-          <a:prstGeom prst="rect">
-            <a:avLst/>
-          </a:prstGeom>
-          <a:noFill/>
-        </p:spPr>
-        <p:txBody>
-          <a:bodyPr wrap="square" rtlCol="0">
-            <a:spAutoFit/>
-          </a:bodyPr>
-          <a:lstStyle/>
-          <a:p>
-            <a:pPr algn="r"/>
-            <a:r>
-              <a:rPr lang="en-SG" sz="1801" dirty="0"/>
-              <a:t>[else]</a:t>
-            </a:r>
-          </a:p>
-        </p:txBody>
-      </p:sp>
-      <p:sp>
-        <p:nvSpPr>
-          <p:cNvPr id="148" name="Rectangle: Rounded Corners 21">
-            <a:extLst>
-              <a:ext uri="{FF2B5EF4-FFF2-40B4-BE49-F238E27FC236}">
-                <a16:creationId xmlns:a16="http://schemas.microsoft.com/office/drawing/2014/main" id="{A323A4FC-FF89-4B75-A4E8-6FA28B7DCA83}"/>
-              </a:ext>
-            </a:extLst>
-          </p:cNvPr>
-          <p:cNvSpPr/>
-          <p:nvPr/>
-        </p:nvSpPr>
-        <p:spPr>
-          <a:xfrm>
-            <a:off x="8155438" y="-9478"/>
-            <a:ext cx="2187019" cy="527900"/>
-          </a:xfrm>
-          <a:prstGeom prst="roundRect">
-            <a:avLst/>
-          </a:prstGeom>
-        </p:spPr>
-        <p:style>
-          <a:lnRef idx="1">
-            <a:schemeClr val="accent6"/>
-          </a:lnRef>
-          <a:fillRef idx="2">
-            <a:schemeClr val="accent6"/>
-          </a:fillRef>
-          <a:effectRef idx="1">
-            <a:schemeClr val="accent6"/>
-          </a:effectRef>
-          <a:fontRef idx="minor">
-            <a:schemeClr val="dk1"/>
-          </a:fontRef>
-        </p:style>
-        <p:txBody>
-          <a:bodyPr rot="0" spcFirstLastPara="0" vertOverflow="overflow" horzOverflow="overflow" vert="horz" wrap="square" lIns="91440" tIns="45721" rIns="91440" bIns="45721" numCol="1" spcCol="0" rtlCol="0" fromWordArt="0" anchor="ctr" anchorCtr="0" forceAA="0" compatLnSpc="1">
-            <a:prstTxWarp prst="textNoShape">
-              <a:avLst/>
-            </a:prstTxWarp>
-            <a:noAutofit/>
-          </a:bodyPr>
-          <a:lstStyle/>
-          <a:p>
-            <a:pPr algn="ctr"/>
-            <a:r>
-              <a:rPr lang="en-SG" sz="1801" dirty="0" smtClean="0"/>
-              <a:t>Add person to list</a:t>
-            </a:r>
-            <a:endParaRPr lang="en-SG" sz="1801" dirty="0"/>
-          </a:p>
-        </p:txBody>
-      </p:sp>
-      <p:cxnSp>
-        <p:nvCxnSpPr>
-          <p:cNvPr id="149" name="Straight Connector 148">
-            <a:extLst>
-              <a:ext uri="{FF2B5EF4-FFF2-40B4-BE49-F238E27FC236}">
-                <a16:creationId xmlns:a16="http://schemas.microsoft.com/office/drawing/2014/main" id="{976EB2B1-1493-46AA-8AF8-DC04DBB508E9}"/>
-              </a:ext>
-            </a:extLst>
-          </p:cNvPr>
-          <p:cNvCxnSpPr>
-            <a:cxnSpLocks/>
-          </p:cNvCxnSpPr>
-          <p:nvPr/>
-        </p:nvCxnSpPr>
-        <p:spPr>
-          <a:xfrm>
-            <a:off x="7797103" y="254472"/>
-            <a:ext cx="0" cy="564242"/>
-          </a:xfrm>
-          <a:prstGeom prst="line">
-            <a:avLst/>
-          </a:prstGeom>
-        </p:spPr>
-        <p:style>
-          <a:lnRef idx="1">
-            <a:schemeClr val="dk1"/>
-          </a:lnRef>
-          <a:fillRef idx="0">
-            <a:schemeClr val="dk1"/>
-          </a:fillRef>
-          <a:effectRef idx="0">
-            <a:schemeClr val="dk1"/>
-          </a:effectRef>
-          <a:fontRef idx="minor">
-            <a:schemeClr val="tx1"/>
-          </a:fontRef>
-        </p:style>
-      </p:cxnSp>
-      <p:sp>
-        <p:nvSpPr>
-          <p:cNvPr id="150" name="Diamond 149">
-            <a:extLst>
-              <a:ext uri="{FF2B5EF4-FFF2-40B4-BE49-F238E27FC236}">
-                <a16:creationId xmlns:a16="http://schemas.microsoft.com/office/drawing/2014/main" id="{CEFA5E0B-0718-4C33-83E9-398CBD71772D}"/>
-              </a:ext>
-            </a:extLst>
-          </p:cNvPr>
-          <p:cNvSpPr/>
-          <p:nvPr/>
-        </p:nvSpPr>
-        <p:spPr>
-          <a:xfrm rot="16200000">
-            <a:off x="10450828" y="818714"/>
-            <a:ext cx="480766" cy="480766"/>
-          </a:xfrm>
-          <a:prstGeom prst="diamond">
-            <a:avLst/>
-          </a:prstGeom>
-        </p:spPr>
-        <p:style>
-          <a:lnRef idx="1">
-            <a:schemeClr val="accent6"/>
-          </a:lnRef>
-          <a:fillRef idx="2">
-            <a:schemeClr val="accent6"/>
-          </a:fillRef>
-          <a:effectRef idx="1">
-            <a:schemeClr val="accent6"/>
-          </a:effectRef>
-          <a:fontRef idx="minor">
-            <a:schemeClr val="dk1"/>
-          </a:fontRef>
-        </p:style>
-        <p:txBody>
-          <a:bodyPr rot="0" spcFirstLastPara="0" vertOverflow="overflow" horzOverflow="overflow" vert="horz" wrap="square" lIns="91440" tIns="45721" rIns="91440" bIns="45721" numCol="1" spcCol="0" rtlCol="0" fromWordArt="0" anchor="ctr" anchorCtr="0" forceAA="0" compatLnSpc="1">
-            <a:prstTxWarp prst="textNoShape">
-              <a:avLst/>
-            </a:prstTxWarp>
-            <a:noAutofit/>
-          </a:bodyPr>
-          <a:lstStyle/>
-          <a:p>
-            <a:pPr algn="ctr"/>
-            <a:endParaRPr lang="en-SG" sz="1801"/>
-          </a:p>
-        </p:txBody>
-      </p:sp>
-      <p:cxnSp>
-        <p:nvCxnSpPr>
-          <p:cNvPr id="151" name="Straight Connector 150">
-            <a:extLst>
-              <a:ext uri="{FF2B5EF4-FFF2-40B4-BE49-F238E27FC236}">
-                <a16:creationId xmlns:a16="http://schemas.microsoft.com/office/drawing/2014/main" id="{98847C5E-DAA5-4B06-82D4-86A7D99EB069}"/>
-              </a:ext>
-            </a:extLst>
-          </p:cNvPr>
-          <p:cNvCxnSpPr>
-            <a:cxnSpLocks/>
-          </p:cNvCxnSpPr>
-          <p:nvPr/>
-        </p:nvCxnSpPr>
-        <p:spPr>
-          <a:xfrm flipH="1">
-            <a:off x="7797103" y="1967789"/>
-            <a:ext cx="2894108" cy="4138"/>
-          </a:xfrm>
-          <a:prstGeom prst="line">
-            <a:avLst/>
-          </a:prstGeom>
-        </p:spPr>
-        <p:style>
-          <a:lnRef idx="1">
-            <a:schemeClr val="dk1"/>
-          </a:lnRef>
-          <a:fillRef idx="0">
-            <a:schemeClr val="dk1"/>
-          </a:fillRef>
-          <a:effectRef idx="0">
-            <a:schemeClr val="dk1"/>
-          </a:effectRef>
-          <a:fontRef idx="minor">
-            <a:schemeClr val="tx1"/>
-          </a:fontRef>
-        </p:style>
-      </p:cxnSp>
-      <p:cxnSp>
-        <p:nvCxnSpPr>
-          <p:cNvPr id="152" name="Straight Arrow Connector 151">
-            <a:extLst>
-              <a:ext uri="{FF2B5EF4-FFF2-40B4-BE49-F238E27FC236}">
-                <a16:creationId xmlns:a16="http://schemas.microsoft.com/office/drawing/2014/main" id="{07205C61-8174-4C37-BC30-E1E54EBEAF6C}"/>
-              </a:ext>
-            </a:extLst>
-          </p:cNvPr>
-          <p:cNvCxnSpPr>
-            <a:cxnSpLocks/>
-            <a:endCxn id="150" idx="1"/>
-          </p:cNvCxnSpPr>
-          <p:nvPr/>
-        </p:nvCxnSpPr>
-        <p:spPr>
-          <a:xfrm flipV="1">
-            <a:off x="10691211" y="1299480"/>
-            <a:ext cx="0" cy="668309"/>
-          </a:xfrm>
-          <a:prstGeom prst="straightConnector1">
-            <a:avLst/>
-          </a:prstGeom>
-          <a:ln>
-            <a:tailEnd type="triangle"/>
-          </a:ln>
-        </p:spPr>
-        <p:style>
-          <a:lnRef idx="1">
-            <a:schemeClr val="dk1"/>
-          </a:lnRef>
-          <a:fillRef idx="0">
-            <a:schemeClr val="dk1"/>
-          </a:fillRef>
-          <a:effectRef idx="0">
-            <a:schemeClr val="dk1"/>
-          </a:effectRef>
-          <a:fontRef idx="minor">
-            <a:schemeClr val="tx1"/>
-          </a:fontRef>
-        </p:style>
-      </p:cxnSp>
-      <p:cxnSp>
-        <p:nvCxnSpPr>
-          <p:cNvPr id="153" name="Straight Connector 152">
-            <a:extLst>
-              <a:ext uri="{FF2B5EF4-FFF2-40B4-BE49-F238E27FC236}">
-                <a16:creationId xmlns:a16="http://schemas.microsoft.com/office/drawing/2014/main" id="{4E0125F5-2933-475D-8E22-23FB92F10BB9}"/>
-              </a:ext>
-            </a:extLst>
-          </p:cNvPr>
-          <p:cNvCxnSpPr>
-            <a:cxnSpLocks/>
-            <a:stCxn id="148" idx="1"/>
-          </p:cNvCxnSpPr>
-          <p:nvPr/>
-        </p:nvCxnSpPr>
-        <p:spPr>
-          <a:xfrm flipH="1">
-            <a:off x="7797103" y="254472"/>
-            <a:ext cx="358335" cy="0"/>
-          </a:xfrm>
-          <a:prstGeom prst="line">
-            <a:avLst/>
-          </a:prstGeom>
-        </p:spPr>
-        <p:style>
-          <a:lnRef idx="1">
-            <a:schemeClr val="dk1"/>
-          </a:lnRef>
-          <a:fillRef idx="0">
-            <a:schemeClr val="dk1"/>
-          </a:fillRef>
-          <a:effectRef idx="0">
-            <a:schemeClr val="dk1"/>
-          </a:effectRef>
-          <a:fontRef idx="minor">
-            <a:schemeClr val="tx1"/>
-          </a:fontRef>
-        </p:style>
-      </p:cxnSp>
-      <p:cxnSp>
-        <p:nvCxnSpPr>
-          <p:cNvPr id="154" name="Straight Arrow Connector 153">
-            <a:extLst>
-              <a:ext uri="{FF2B5EF4-FFF2-40B4-BE49-F238E27FC236}">
-                <a16:creationId xmlns:a16="http://schemas.microsoft.com/office/drawing/2014/main" id="{6A0B3198-7B18-417D-A041-B13DF5BAE7A6}"/>
-              </a:ext>
-            </a:extLst>
-          </p:cNvPr>
-          <p:cNvCxnSpPr>
-            <a:cxnSpLocks/>
-          </p:cNvCxnSpPr>
-          <p:nvPr/>
-        </p:nvCxnSpPr>
-        <p:spPr>
-          <a:xfrm flipV="1">
-            <a:off x="6824737" y="1059097"/>
-            <a:ext cx="731985" cy="5349"/>
-          </a:xfrm>
-          <a:prstGeom prst="straightConnector1">
-            <a:avLst/>
-          </a:prstGeom>
-          <a:ln>
-            <a:tailEnd type="triangle"/>
-          </a:ln>
-        </p:spPr>
-        <p:style>
-          <a:lnRef idx="1">
-            <a:schemeClr val="dk1"/>
-          </a:lnRef>
-          <a:fillRef idx="0">
-            <a:schemeClr val="dk1"/>
-          </a:fillRef>
-          <a:effectRef idx="0">
-            <a:schemeClr val="dk1"/>
-          </a:effectRef>
-          <a:fontRef idx="minor">
-            <a:schemeClr val="tx1"/>
-          </a:fontRef>
-        </p:style>
-      </p:cxnSp>
-      <p:cxnSp>
-        <p:nvCxnSpPr>
-          <p:cNvPr id="155" name="Straight Arrow Connector 154">
-            <a:extLst>
-              <a:ext uri="{FF2B5EF4-FFF2-40B4-BE49-F238E27FC236}">
-                <a16:creationId xmlns:a16="http://schemas.microsoft.com/office/drawing/2014/main" id="{F19B7A29-4E76-4FF6-AB20-F964D8CE510E}"/>
-              </a:ext>
-            </a:extLst>
-          </p:cNvPr>
-          <p:cNvCxnSpPr>
-            <a:cxnSpLocks/>
-            <a:endCxn id="150" idx="3"/>
-          </p:cNvCxnSpPr>
-          <p:nvPr/>
-        </p:nvCxnSpPr>
-        <p:spPr>
-          <a:xfrm>
-            <a:off x="10691211" y="254472"/>
-            <a:ext cx="0" cy="564242"/>
-          </a:xfrm>
-          <a:prstGeom prst="straightConnector1">
-            <a:avLst/>
-          </a:prstGeom>
-          <a:ln>
-            <a:tailEnd type="triangle"/>
-          </a:ln>
-        </p:spPr>
-        <p:style>
-          <a:lnRef idx="1">
-            <a:schemeClr val="dk1"/>
-          </a:lnRef>
-          <a:fillRef idx="0">
-            <a:schemeClr val="dk1"/>
-          </a:fillRef>
-          <a:effectRef idx="0">
-            <a:schemeClr val="dk1"/>
-          </a:effectRef>
-          <a:fontRef idx="minor">
-            <a:schemeClr val="tx1"/>
-          </a:fontRef>
-        </p:style>
-      </p:cxnSp>
-      <p:cxnSp>
-        <p:nvCxnSpPr>
-          <p:cNvPr id="156" name="Straight Connector 155">
-            <a:extLst>
-              <a:ext uri="{FF2B5EF4-FFF2-40B4-BE49-F238E27FC236}">
-                <a16:creationId xmlns:a16="http://schemas.microsoft.com/office/drawing/2014/main" id="{A5E6814F-A860-451B-9266-310BAEA7CDAC}"/>
-              </a:ext>
-            </a:extLst>
-          </p:cNvPr>
-          <p:cNvCxnSpPr>
-            <a:cxnSpLocks/>
-            <a:stCxn id="148" idx="3"/>
-          </p:cNvCxnSpPr>
-          <p:nvPr/>
-        </p:nvCxnSpPr>
-        <p:spPr>
-          <a:xfrm>
-            <a:off x="10342457" y="254472"/>
-            <a:ext cx="348754" cy="0"/>
-          </a:xfrm>
-          <a:prstGeom prst="line">
-            <a:avLst/>
-          </a:prstGeom>
-        </p:spPr>
-        <p:style>
-          <a:lnRef idx="1">
-            <a:schemeClr val="dk1"/>
-          </a:lnRef>
-          <a:fillRef idx="0">
-            <a:schemeClr val="dk1"/>
-          </a:fillRef>
-          <a:effectRef idx="0">
-            <a:schemeClr val="dk1"/>
-          </a:effectRef>
-          <a:fontRef idx="minor">
-            <a:schemeClr val="tx1"/>
-          </a:fontRef>
-        </p:style>
-      </p:cxnSp>
-      <p:sp>
-        <p:nvSpPr>
-          <p:cNvPr id="183" name="Diamond 182">
-            <a:extLst>
-              <a:ext uri="{FF2B5EF4-FFF2-40B4-BE49-F238E27FC236}">
-                <a16:creationId xmlns:a16="http://schemas.microsoft.com/office/drawing/2014/main" id="{8E8723C3-03E7-46BE-8211-AAF9ADC7B033}"/>
-              </a:ext>
-            </a:extLst>
-          </p:cNvPr>
-          <p:cNvSpPr/>
-          <p:nvPr/>
-        </p:nvSpPr>
-        <p:spPr>
-          <a:xfrm rot="5400000">
-            <a:off x="11656818" y="813799"/>
-            <a:ext cx="480766" cy="480766"/>
-          </a:xfrm>
-          <a:prstGeom prst="diamond">
-            <a:avLst/>
-          </a:prstGeom>
-        </p:spPr>
-        <p:style>
-          <a:lnRef idx="1">
-            <a:schemeClr val="accent4"/>
-          </a:lnRef>
-          <a:fillRef idx="2">
-            <a:schemeClr val="accent4"/>
-          </a:fillRef>
-          <a:effectRef idx="1">
-            <a:schemeClr val="accent4"/>
-          </a:effectRef>
-          <a:fontRef idx="minor">
-            <a:schemeClr val="dk1"/>
-          </a:fontRef>
-        </p:style>
-        <p:txBody>
-          <a:bodyPr rot="0" spcFirstLastPara="0" vertOverflow="overflow" horzOverflow="overflow" vert="horz" wrap="square" lIns="91440" tIns="45721" rIns="91440" bIns="45721" numCol="1" spcCol="0" rtlCol="0" fromWordArt="0" anchor="ctr" anchorCtr="0" forceAA="0" compatLnSpc="1">
-            <a:prstTxWarp prst="textNoShape">
-              <a:avLst/>
-            </a:prstTxWarp>
-            <a:noAutofit/>
-          </a:bodyPr>
-          <a:lstStyle/>
-          <a:p>
-            <a:pPr algn="ctr"/>
-            <a:endParaRPr lang="en-SG" sz="1801"/>
-          </a:p>
-        </p:txBody>
-      </p:sp>
-      <p:cxnSp>
-        <p:nvCxnSpPr>
-          <p:cNvPr id="184" name="Straight Connector 183">
-            <a:extLst>
-              <a:ext uri="{FF2B5EF4-FFF2-40B4-BE49-F238E27FC236}">
-                <a16:creationId xmlns:a16="http://schemas.microsoft.com/office/drawing/2014/main" id="{E9F9F46E-F315-4E20-BA19-DC5A481900A9}"/>
-              </a:ext>
-            </a:extLst>
-          </p:cNvPr>
-          <p:cNvCxnSpPr/>
-          <p:nvPr/>
-        </p:nvCxnSpPr>
-        <p:spPr>
-          <a:xfrm rot="5400000">
-            <a:off x="11560977" y="1630788"/>
-            <a:ext cx="672446" cy="1"/>
-          </a:xfrm>
-          <a:prstGeom prst="line">
-            <a:avLst/>
-          </a:prstGeom>
-        </p:spPr>
-        <p:style>
-          <a:lnRef idx="1">
-            <a:schemeClr val="dk1"/>
-          </a:lnRef>
-          <a:fillRef idx="0">
-            <a:schemeClr val="dk1"/>
-          </a:fillRef>
-          <a:effectRef idx="0">
-            <a:schemeClr val="dk1"/>
-          </a:effectRef>
-          <a:fontRef idx="minor">
-            <a:schemeClr val="tx1"/>
-          </a:fontRef>
-        </p:style>
-      </p:cxnSp>
-      <p:sp>
-        <p:nvSpPr>
-          <p:cNvPr id="185" name="TextBox 184">
-            <a:extLst>
-              <a:ext uri="{FF2B5EF4-FFF2-40B4-BE49-F238E27FC236}">
-                <a16:creationId xmlns:a16="http://schemas.microsoft.com/office/drawing/2014/main" id="{3ABD3846-DF71-49C4-AE22-6CE1C8B39149}"/>
-              </a:ext>
-            </a:extLst>
-          </p:cNvPr>
-          <p:cNvSpPr txBox="1"/>
-          <p:nvPr/>
-        </p:nvSpPr>
-        <p:spPr>
-          <a:xfrm>
-            <a:off x="10403266" y="-399789"/>
-            <a:ext cx="1899500" cy="646587"/>
-          </a:xfrm>
-          <a:prstGeom prst="rect">
-            <a:avLst/>
-          </a:prstGeom>
-          <a:noFill/>
-        </p:spPr>
-        <p:txBody>
-          <a:bodyPr wrap="square" rtlCol="0">
-            <a:spAutoFit/>
-          </a:bodyPr>
-          <a:lstStyle/>
-          <a:p>
-            <a:pPr algn="r"/>
-            <a:r>
-              <a:rPr lang="en-SG" sz="1801" dirty="0" smtClean="0"/>
-              <a:t>[match other conditions]</a:t>
-            </a:r>
-            <a:endParaRPr lang="en-SG" sz="1801" dirty="0"/>
-          </a:p>
-        </p:txBody>
-      </p:sp>
-      <p:sp>
-        <p:nvSpPr>
-          <p:cNvPr id="186" name="TextBox 185">
-            <a:extLst>
-              <a:ext uri="{FF2B5EF4-FFF2-40B4-BE49-F238E27FC236}">
-                <a16:creationId xmlns:a16="http://schemas.microsoft.com/office/drawing/2014/main" id="{950BB788-4B9F-4654-A5F0-F380DA681824}"/>
-              </a:ext>
-            </a:extLst>
-          </p:cNvPr>
-          <p:cNvSpPr txBox="1"/>
-          <p:nvPr/>
-        </p:nvSpPr>
-        <p:spPr>
-          <a:xfrm>
-            <a:off x="11126675" y="1630788"/>
-            <a:ext cx="853127" cy="369460"/>
-          </a:xfrm>
-          <a:prstGeom prst="rect">
-            <a:avLst/>
-          </a:prstGeom>
-          <a:noFill/>
-        </p:spPr>
-        <p:txBody>
-          <a:bodyPr wrap="square" rtlCol="0">
-            <a:spAutoFit/>
-          </a:bodyPr>
-          <a:lstStyle/>
-          <a:p>
-            <a:pPr algn="r"/>
-            <a:r>
-              <a:rPr lang="en-SG" sz="1801" dirty="0"/>
-              <a:t>[else]</a:t>
-            </a:r>
-          </a:p>
-        </p:txBody>
-      </p:sp>
-      <p:sp>
-        <p:nvSpPr>
-          <p:cNvPr id="187" name="Rectangle: Rounded Corners 21">
-            <a:extLst>
-              <a:ext uri="{FF2B5EF4-FFF2-40B4-BE49-F238E27FC236}">
-                <a16:creationId xmlns:a16="http://schemas.microsoft.com/office/drawing/2014/main" id="{A323A4FC-FF89-4B75-A4E8-6FA28B7DCA83}"/>
-              </a:ext>
-            </a:extLst>
-          </p:cNvPr>
-          <p:cNvSpPr/>
-          <p:nvPr/>
-        </p:nvSpPr>
-        <p:spPr>
-          <a:xfrm>
-            <a:off x="12255534" y="-14393"/>
-            <a:ext cx="2187019" cy="527900"/>
-          </a:xfrm>
-          <a:prstGeom prst="roundRect">
-            <a:avLst/>
-          </a:prstGeom>
-        </p:spPr>
-        <p:style>
-          <a:lnRef idx="1">
-            <a:schemeClr val="accent4"/>
-          </a:lnRef>
-          <a:fillRef idx="2">
-            <a:schemeClr val="accent4"/>
-          </a:fillRef>
-          <a:effectRef idx="1">
-            <a:schemeClr val="accent4"/>
-          </a:effectRef>
-          <a:fontRef idx="minor">
-            <a:schemeClr val="dk1"/>
-          </a:fontRef>
-        </p:style>
-        <p:txBody>
-          <a:bodyPr rot="0" spcFirstLastPara="0" vertOverflow="overflow" horzOverflow="overflow" vert="horz" wrap="square" lIns="91440" tIns="45721" rIns="91440" bIns="45721" numCol="1" spcCol="0" rtlCol="0" fromWordArt="0" anchor="ctr" anchorCtr="0" forceAA="0" compatLnSpc="1">
-            <a:prstTxWarp prst="textNoShape">
-              <a:avLst/>
-            </a:prstTxWarp>
-            <a:noAutofit/>
-          </a:bodyPr>
-          <a:lstStyle/>
-          <a:p>
-            <a:pPr algn="ctr"/>
-            <a:r>
-              <a:rPr lang="en-SG" sz="1801" dirty="0" smtClean="0"/>
-              <a:t>Add person to list</a:t>
-            </a:r>
-            <a:endParaRPr lang="en-SG" sz="1801" dirty="0"/>
-          </a:p>
-        </p:txBody>
-      </p:sp>
-      <p:cxnSp>
-        <p:nvCxnSpPr>
-          <p:cNvPr id="188" name="Straight Connector 187">
-            <a:extLst>
-              <a:ext uri="{FF2B5EF4-FFF2-40B4-BE49-F238E27FC236}">
-                <a16:creationId xmlns:a16="http://schemas.microsoft.com/office/drawing/2014/main" id="{976EB2B1-1493-46AA-8AF8-DC04DBB508E9}"/>
-              </a:ext>
-            </a:extLst>
-          </p:cNvPr>
-          <p:cNvCxnSpPr>
-            <a:cxnSpLocks/>
-          </p:cNvCxnSpPr>
-          <p:nvPr/>
-        </p:nvCxnSpPr>
-        <p:spPr>
-          <a:xfrm>
-            <a:off x="11897199" y="249557"/>
-            <a:ext cx="0" cy="564242"/>
-          </a:xfrm>
-          <a:prstGeom prst="line">
-            <a:avLst/>
-          </a:prstGeom>
-        </p:spPr>
-        <p:style>
-          <a:lnRef idx="1">
-            <a:schemeClr val="dk1"/>
-          </a:lnRef>
-          <a:fillRef idx="0">
-            <a:schemeClr val="dk1"/>
-          </a:fillRef>
-          <a:effectRef idx="0">
-            <a:schemeClr val="dk1"/>
-          </a:effectRef>
-          <a:fontRef idx="minor">
-            <a:schemeClr val="tx1"/>
-          </a:fontRef>
-        </p:style>
-      </p:cxnSp>
-      <p:sp>
-        <p:nvSpPr>
-          <p:cNvPr id="189" name="Diamond 188">
-            <a:extLst>
-              <a:ext uri="{FF2B5EF4-FFF2-40B4-BE49-F238E27FC236}">
-                <a16:creationId xmlns:a16="http://schemas.microsoft.com/office/drawing/2014/main" id="{CEFA5E0B-0718-4C33-83E9-398CBD71772D}"/>
-              </a:ext>
-            </a:extLst>
-          </p:cNvPr>
-          <p:cNvSpPr/>
-          <p:nvPr/>
-        </p:nvSpPr>
-        <p:spPr>
-          <a:xfrm rot="16200000">
-            <a:off x="14550924" y="813799"/>
-            <a:ext cx="480766" cy="480766"/>
-          </a:xfrm>
-          <a:prstGeom prst="diamond">
-            <a:avLst/>
-          </a:prstGeom>
-        </p:spPr>
-        <p:style>
-          <a:lnRef idx="1">
-            <a:schemeClr val="accent4"/>
-          </a:lnRef>
-          <a:fillRef idx="2">
-            <a:schemeClr val="accent4"/>
-          </a:fillRef>
-          <a:effectRef idx="1">
-            <a:schemeClr val="accent4"/>
-          </a:effectRef>
-          <a:fontRef idx="minor">
-            <a:schemeClr val="dk1"/>
-          </a:fontRef>
-        </p:style>
-        <p:txBody>
-          <a:bodyPr rot="0" spcFirstLastPara="0" vertOverflow="overflow" horzOverflow="overflow" vert="horz" wrap="square" lIns="91440" tIns="45721" rIns="91440" bIns="45721" numCol="1" spcCol="0" rtlCol="0" fromWordArt="0" anchor="ctr" anchorCtr="0" forceAA="0" compatLnSpc="1">
-            <a:prstTxWarp prst="textNoShape">
-              <a:avLst/>
-            </a:prstTxWarp>
-            <a:noAutofit/>
-          </a:bodyPr>
-          <a:lstStyle/>
-          <a:p>
-            <a:pPr algn="ctr"/>
-            <a:endParaRPr lang="en-SG" sz="1801"/>
-          </a:p>
-        </p:txBody>
-      </p:sp>
-      <p:cxnSp>
-        <p:nvCxnSpPr>
-          <p:cNvPr id="190" name="Straight Connector 189">
-            <a:extLst>
-              <a:ext uri="{FF2B5EF4-FFF2-40B4-BE49-F238E27FC236}">
-                <a16:creationId xmlns:a16="http://schemas.microsoft.com/office/drawing/2014/main" id="{98847C5E-DAA5-4B06-82D4-86A7D99EB069}"/>
-              </a:ext>
-            </a:extLst>
-          </p:cNvPr>
-          <p:cNvCxnSpPr>
-            <a:cxnSpLocks/>
-          </p:cNvCxnSpPr>
-          <p:nvPr/>
-        </p:nvCxnSpPr>
-        <p:spPr>
-          <a:xfrm flipH="1">
-            <a:off x="11897199" y="1962874"/>
-            <a:ext cx="2894108" cy="4138"/>
-          </a:xfrm>
-          <a:prstGeom prst="line">
-            <a:avLst/>
-          </a:prstGeom>
-        </p:spPr>
-        <p:style>
-          <a:lnRef idx="1">
-            <a:schemeClr val="dk1"/>
-          </a:lnRef>
-          <a:fillRef idx="0">
-            <a:schemeClr val="dk1"/>
-          </a:fillRef>
-          <a:effectRef idx="0">
-            <a:schemeClr val="dk1"/>
-          </a:effectRef>
-          <a:fontRef idx="minor">
-            <a:schemeClr val="tx1"/>
-          </a:fontRef>
-        </p:style>
-      </p:cxnSp>
-      <p:cxnSp>
-        <p:nvCxnSpPr>
-          <p:cNvPr id="191" name="Straight Arrow Connector 190">
-            <a:extLst>
-              <a:ext uri="{FF2B5EF4-FFF2-40B4-BE49-F238E27FC236}">
-                <a16:creationId xmlns:a16="http://schemas.microsoft.com/office/drawing/2014/main" id="{07205C61-8174-4C37-BC30-E1E54EBEAF6C}"/>
-              </a:ext>
-            </a:extLst>
-          </p:cNvPr>
-          <p:cNvCxnSpPr>
-            <a:cxnSpLocks/>
-            <a:endCxn id="189" idx="1"/>
-          </p:cNvCxnSpPr>
-          <p:nvPr/>
-        </p:nvCxnSpPr>
-        <p:spPr>
-          <a:xfrm flipV="1">
-            <a:off x="14791307" y="1294565"/>
-            <a:ext cx="0" cy="668309"/>
-          </a:xfrm>
-          <a:prstGeom prst="straightConnector1">
-            <a:avLst/>
-          </a:prstGeom>
-          <a:ln>
-            <a:tailEnd type="triangle"/>
-          </a:ln>
-        </p:spPr>
-        <p:style>
-          <a:lnRef idx="1">
-            <a:schemeClr val="dk1"/>
-          </a:lnRef>
-          <a:fillRef idx="0">
-            <a:schemeClr val="dk1"/>
-          </a:fillRef>
-          <a:effectRef idx="0">
-            <a:schemeClr val="dk1"/>
-          </a:effectRef>
-          <a:fontRef idx="minor">
-            <a:schemeClr val="tx1"/>
-          </a:fontRef>
-        </p:style>
-      </p:cxnSp>
-      <p:cxnSp>
-        <p:nvCxnSpPr>
-          <p:cNvPr id="192" name="Straight Connector 191">
-            <a:extLst>
-              <a:ext uri="{FF2B5EF4-FFF2-40B4-BE49-F238E27FC236}">
-                <a16:creationId xmlns:a16="http://schemas.microsoft.com/office/drawing/2014/main" id="{4E0125F5-2933-475D-8E22-23FB92F10BB9}"/>
-              </a:ext>
-            </a:extLst>
-          </p:cNvPr>
-          <p:cNvCxnSpPr>
-            <a:cxnSpLocks/>
-            <a:stCxn id="187" idx="1"/>
-          </p:cNvCxnSpPr>
-          <p:nvPr/>
-        </p:nvCxnSpPr>
-        <p:spPr>
-          <a:xfrm flipH="1">
-            <a:off x="11897199" y="249557"/>
-            <a:ext cx="358335" cy="0"/>
-          </a:xfrm>
-          <a:prstGeom prst="line">
-            <a:avLst/>
-          </a:prstGeom>
-        </p:spPr>
-        <p:style>
-          <a:lnRef idx="1">
-            <a:schemeClr val="dk1"/>
-          </a:lnRef>
-          <a:fillRef idx="0">
-            <a:schemeClr val="dk1"/>
-          </a:fillRef>
-          <a:effectRef idx="0">
-            <a:schemeClr val="dk1"/>
-          </a:effectRef>
-          <a:fontRef idx="minor">
-            <a:schemeClr val="tx1"/>
-          </a:fontRef>
-        </p:style>
-      </p:cxnSp>
-      <p:cxnSp>
-        <p:nvCxnSpPr>
-          <p:cNvPr id="193" name="Straight Arrow Connector 192">
-            <a:extLst>
-              <a:ext uri="{FF2B5EF4-FFF2-40B4-BE49-F238E27FC236}">
-                <a16:creationId xmlns:a16="http://schemas.microsoft.com/office/drawing/2014/main" id="{6A0B3198-7B18-417D-A041-B13DF5BAE7A6}"/>
-              </a:ext>
-            </a:extLst>
-          </p:cNvPr>
-          <p:cNvCxnSpPr>
-            <a:cxnSpLocks/>
-          </p:cNvCxnSpPr>
-          <p:nvPr/>
-        </p:nvCxnSpPr>
-        <p:spPr>
-          <a:xfrm flipV="1">
-            <a:off x="10924833" y="1054182"/>
-            <a:ext cx="731985" cy="5349"/>
-          </a:xfrm>
-          <a:prstGeom prst="straightConnector1">
-            <a:avLst/>
-          </a:prstGeom>
-          <a:ln>
-            <a:tailEnd type="triangle"/>
-          </a:ln>
-        </p:spPr>
-        <p:style>
-          <a:lnRef idx="1">
-            <a:schemeClr val="dk1"/>
-          </a:lnRef>
-          <a:fillRef idx="0">
-            <a:schemeClr val="dk1"/>
-          </a:fillRef>
-          <a:effectRef idx="0">
-            <a:schemeClr val="dk1"/>
-          </a:effectRef>
-          <a:fontRef idx="minor">
-            <a:schemeClr val="tx1"/>
-          </a:fontRef>
-        </p:style>
-      </p:cxnSp>
-      <p:cxnSp>
-        <p:nvCxnSpPr>
-          <p:cNvPr id="194" name="Straight Arrow Connector 193">
-            <a:extLst>
-              <a:ext uri="{FF2B5EF4-FFF2-40B4-BE49-F238E27FC236}">
-                <a16:creationId xmlns:a16="http://schemas.microsoft.com/office/drawing/2014/main" id="{F19B7A29-4E76-4FF6-AB20-F964D8CE510E}"/>
-              </a:ext>
-            </a:extLst>
-          </p:cNvPr>
-          <p:cNvCxnSpPr>
-            <a:cxnSpLocks/>
-            <a:endCxn id="189" idx="3"/>
-          </p:cNvCxnSpPr>
-          <p:nvPr/>
-        </p:nvCxnSpPr>
-        <p:spPr>
-          <a:xfrm>
-            <a:off x="14791307" y="249557"/>
-            <a:ext cx="0" cy="564242"/>
-          </a:xfrm>
-          <a:prstGeom prst="straightConnector1">
-            <a:avLst/>
-          </a:prstGeom>
-          <a:ln>
-            <a:tailEnd type="triangle"/>
-          </a:ln>
-        </p:spPr>
-        <p:style>
-          <a:lnRef idx="1">
-            <a:schemeClr val="dk1"/>
-          </a:lnRef>
-          <a:fillRef idx="0">
-            <a:schemeClr val="dk1"/>
-          </a:fillRef>
-          <a:effectRef idx="0">
-            <a:schemeClr val="dk1"/>
-          </a:effectRef>
-          <a:fontRef idx="minor">
-            <a:schemeClr val="tx1"/>
-          </a:fontRef>
-        </p:style>
-      </p:cxnSp>
-      <p:cxnSp>
-        <p:nvCxnSpPr>
-          <p:cNvPr id="195" name="Straight Connector 194">
-            <a:extLst>
-              <a:ext uri="{FF2B5EF4-FFF2-40B4-BE49-F238E27FC236}">
-                <a16:creationId xmlns:a16="http://schemas.microsoft.com/office/drawing/2014/main" id="{A5E6814F-A860-451B-9266-310BAEA7CDAC}"/>
-              </a:ext>
-            </a:extLst>
-          </p:cNvPr>
-          <p:cNvCxnSpPr>
-            <a:cxnSpLocks/>
-            <a:stCxn id="187" idx="3"/>
-          </p:cNvCxnSpPr>
-          <p:nvPr/>
-        </p:nvCxnSpPr>
-        <p:spPr>
-          <a:xfrm>
-            <a:off x="14442553" y="249557"/>
-            <a:ext cx="348754" cy="0"/>
-          </a:xfrm>
-          <a:prstGeom prst="line">
-            <a:avLst/>
-          </a:prstGeom>
         </p:spPr>
         <p:style>
           <a:lnRef idx="1">

</xml_diff>